<commit_message>
Facility and Severity explained.
</commit_message>
<xml_diff>
--- a/11.Logging/11-Logging.pptx
+++ b/11.Logging/11-Logging.pptx
@@ -5,13 +5,15 @@
     <p:sldMasterId id="2147483648" r:id="rId1"/>
   </p:sldMasterIdLst>
   <p:notesMasterIdLst>
-    <p:notesMasterId r:id="rId6"/>
+    <p:notesMasterId r:id="rId8"/>
   </p:notesMasterIdLst>
   <p:sldIdLst>
     <p:sldId id="284" r:id="rId2"/>
     <p:sldId id="285" r:id="rId3"/>
     <p:sldId id="286" r:id="rId4"/>
     <p:sldId id="287" r:id="rId5"/>
+    <p:sldId id="288" r:id="rId6"/>
+    <p:sldId id="289" r:id="rId7"/>
   </p:sldIdLst>
   <p:sldSz cx="9144000" cy="6858000" type="screen4x3"/>
   <p:notesSz cx="6858000" cy="9144000"/>
@@ -3646,15 +3648,7 @@
                   <a:schemeClr val="accent6"/>
                 </a:solidFill>
               </a:rPr>
-              <a:t>Most services used on a Linu</a:t>
-            </a:r>
-            <a:r>
-              <a:rPr lang="en-US" dirty="0" smtClean="0">
-                <a:solidFill>
-                  <a:schemeClr val="accent6"/>
-                </a:solidFill>
-              </a:rPr>
-              <a:t>x node write information to log files. This information can be written to different destinations. There are 3 ways to store logs under Linux:</a:t>
+              <a:t>Most services used on a Linux node write information to log files. This information can be written to different destinations. There are 3 ways to store logs under Linux:</a:t>
             </a:r>
           </a:p>
           <a:p>
@@ -3667,15 +3661,7 @@
                   <a:schemeClr val="accent6"/>
                 </a:solidFill>
               </a:rPr>
-              <a:t>Direct write =&gt; some services write loggin</a:t>
-            </a:r>
-            <a:r>
-              <a:rPr lang="en-US" dirty="0" smtClean="0">
-                <a:solidFill>
-                  <a:schemeClr val="accent6"/>
-                </a:solidFill>
-              </a:rPr>
-              <a:t>g information directly to the log files(Apache, Samba).</a:t>
+              <a:t>Direct write =&gt; some services write logging information directly to the log files(Apache, Samba).</a:t>
             </a:r>
           </a:p>
           <a:p>
@@ -3704,29 +3690,8 @@
                   <a:schemeClr val="accent6"/>
                 </a:solidFill>
               </a:rPr>
-              <a:t> =&gt; </a:t>
-            </a:r>
-            <a:r>
-              <a:rPr lang="en-US" dirty="0" smtClean="0">
-                <a:solidFill>
-                  <a:schemeClr val="accent6"/>
-                </a:solidFill>
-              </a:rPr>
-              <a:t>A</a:t>
-            </a:r>
-            <a:r>
-              <a:rPr lang="en-US" dirty="0" smtClean="0">
-                <a:solidFill>
-                  <a:schemeClr val="accent6"/>
-                </a:solidFill>
-              </a:rPr>
-              <a:t> service that takes care of managing centralized log files.</a:t>
-            </a:r>
-            <a:endParaRPr lang="en-US" dirty="0" smtClean="0">
-              <a:solidFill>
-                <a:schemeClr val="accent6"/>
-              </a:solidFill>
-            </a:endParaRPr>
+              <a:t> =&gt; A service that takes care of managing centralized log files.</a:t>
+            </a:r>
           </a:p>
           <a:p>
             <a:pPr marL="342900" indent="-342900">
@@ -4722,7 +4687,7 @@
               </a:rPr>
             </a:br>
             <a:r>
-              <a:rPr lang="en-US" dirty="0" smtClean="0">
+              <a:rPr lang="en-US" sz="2200" dirty="0" smtClean="0">
                 <a:solidFill>
                   <a:srgbClr val="FF0000"/>
                 </a:solidFill>
@@ -4730,7 +4695,7 @@
               <a:t>Exercises:</a:t>
             </a:r>
             <a:r>
-              <a:rPr lang="en-US" dirty="0" smtClean="0">
+              <a:rPr lang="en-US" sz="2200" dirty="0" smtClean="0">
                 <a:solidFill>
                   <a:schemeClr val="accent6"/>
                 </a:solidFill>
@@ -4738,14 +4703,14 @@
               <a:t/>
             </a:r>
             <a:br>
-              <a:rPr lang="en-US" dirty="0" smtClean="0">
-                <a:solidFill>
-                  <a:schemeClr val="accent6"/>
-                </a:solidFill>
-              </a:rPr>
-            </a:br>
-            <a:r>
-              <a:rPr lang="en-US" dirty="0" smtClean="0">
+              <a:rPr lang="en-US" sz="2200" dirty="0" smtClean="0">
+                <a:solidFill>
+                  <a:schemeClr val="accent6"/>
+                </a:solidFill>
+              </a:rPr>
+            </a:br>
+            <a:r>
+              <a:rPr lang="en-US" sz="2200" dirty="0" smtClean="0">
                 <a:solidFill>
                   <a:schemeClr val="accent6"/>
                 </a:solidFill>
@@ -4753,7 +4718,7 @@
               <a:t>1. tail –n 20 /</a:t>
             </a:r>
             <a:r>
-              <a:rPr lang="en-US" dirty="0" err="1" smtClean="0">
+              <a:rPr lang="en-US" sz="2200" dirty="0" err="1" smtClean="0">
                 <a:solidFill>
                   <a:schemeClr val="accent6"/>
                 </a:solidFill>
@@ -4761,7 +4726,7 @@
               <a:t>var</a:t>
             </a:r>
             <a:r>
-              <a:rPr lang="en-US" dirty="0" smtClean="0">
+              <a:rPr lang="en-US" sz="2200" dirty="0" smtClean="0">
                 <a:solidFill>
                   <a:schemeClr val="accent6"/>
                 </a:solidFill>
@@ -4769,14 +4734,14 @@
               <a:t>/log/messages</a:t>
             </a:r>
             <a:br>
-              <a:rPr lang="en-US" dirty="0" smtClean="0">
-                <a:solidFill>
-                  <a:schemeClr val="accent6"/>
-                </a:solidFill>
-              </a:rPr>
-            </a:br>
-            <a:r>
-              <a:rPr lang="en-US" dirty="0" smtClean="0">
+              <a:rPr lang="en-US" sz="2200" dirty="0" smtClean="0">
+                <a:solidFill>
+                  <a:schemeClr val="accent6"/>
+                </a:solidFill>
+              </a:rPr>
+            </a:br>
+            <a:r>
+              <a:rPr lang="en-US" sz="2200" dirty="0" smtClean="0">
                 <a:solidFill>
                   <a:schemeClr val="accent6"/>
                 </a:solidFill>
@@ -4784,14 +4749,14 @@
               <a:t>2. Analyze a log line.</a:t>
             </a:r>
             <a:br>
-              <a:rPr lang="en-US" dirty="0" smtClean="0">
-                <a:solidFill>
-                  <a:schemeClr val="accent6"/>
-                </a:solidFill>
-              </a:rPr>
-            </a:br>
-            <a:r>
-              <a:rPr lang="en-US" dirty="0" smtClean="0">
+              <a:rPr lang="en-US" sz="2200" dirty="0" smtClean="0">
+                <a:solidFill>
+                  <a:schemeClr val="accent6"/>
+                </a:solidFill>
+              </a:rPr>
+            </a:br>
+            <a:r>
+              <a:rPr lang="en-US" sz="2200" dirty="0" smtClean="0">
                 <a:solidFill>
                   <a:schemeClr val="accent6"/>
                 </a:solidFill>
@@ -4799,14 +4764,14 @@
               <a:t>Date and Time? Host ? Service or process name ? Message Content ? </a:t>
             </a:r>
             <a:br>
-              <a:rPr lang="en-US" dirty="0" smtClean="0">
-                <a:solidFill>
-                  <a:schemeClr val="accent6"/>
-                </a:solidFill>
-              </a:rPr>
-            </a:br>
-            <a:r>
-              <a:rPr lang="en-US" dirty="0" smtClean="0">
+              <a:rPr lang="en-US" sz="2200" dirty="0" smtClean="0">
+                <a:solidFill>
+                  <a:schemeClr val="accent6"/>
+                </a:solidFill>
+              </a:rPr>
+            </a:br>
+            <a:r>
+              <a:rPr lang="en-US" sz="2200" dirty="0" smtClean="0">
                 <a:solidFill>
                   <a:schemeClr val="accent6"/>
                 </a:solidFill>
@@ -4814,7 +4779,7 @@
               <a:t>3. tail –f /</a:t>
             </a:r>
             <a:r>
-              <a:rPr lang="en-US" dirty="0" err="1" smtClean="0">
+              <a:rPr lang="en-US" sz="2200" dirty="0" err="1" smtClean="0">
                 <a:solidFill>
                   <a:schemeClr val="accent6"/>
                 </a:solidFill>
@@ -4822,7 +4787,7 @@
               <a:t>var</a:t>
             </a:r>
             <a:r>
-              <a:rPr lang="en-US" dirty="0" smtClean="0">
+              <a:rPr lang="en-US" sz="2200" dirty="0" smtClean="0">
                 <a:solidFill>
                   <a:schemeClr val="accent6"/>
                 </a:solidFill>
@@ -4830,7 +4795,7 @@
               <a:t>/log/audit/audit.log ; open another process =&gt; </a:t>
             </a:r>
             <a:r>
-              <a:rPr lang="en-US" dirty="0" err="1" smtClean="0">
+              <a:rPr lang="en-US" sz="2200" dirty="0" err="1" smtClean="0">
                 <a:solidFill>
                   <a:schemeClr val="accent6"/>
                 </a:solidFill>
@@ -4838,40 +4803,18 @@
               <a:t>ssh</a:t>
             </a:r>
             <a:r>
-              <a:rPr lang="en-US" dirty="0" smtClean="0">
+              <a:rPr lang="en-US" sz="2200" dirty="0" smtClean="0">
                 <a:solidFill>
                   <a:schemeClr val="accent6"/>
                 </a:solidFill>
               </a:rPr>
               <a:t> localhost; what happened ?  </a:t>
             </a:r>
-            <a:endParaRPr lang="en-US" dirty="0">
+            <a:endParaRPr lang="en-US" sz="2200" dirty="0">
               <a:solidFill>
                 <a:schemeClr val="accent6"/>
               </a:solidFill>
             </a:endParaRPr>
-          </a:p>
-        </p:txBody>
-      </p:sp>
-      <p:sp>
-        <p:nvSpPr>
-          <p:cNvPr id="3" name="Content Placeholder 2"/>
-          <p:cNvSpPr>
-            <a:spLocks noGrp="1"/>
-          </p:cNvSpPr>
-          <p:nvPr>
-            <p:ph idx="1"/>
-          </p:nvPr>
-        </p:nvSpPr>
-        <p:spPr/>
-        <p:txBody>
-          <a:bodyPr/>
-          <a:lstStyle/>
-          <a:p>
-            <a:pPr marL="0" indent="0">
-              <a:buNone/>
-            </a:pPr>
-            <a:endParaRPr lang="en-US" dirty="0"/>
           </a:p>
         </p:txBody>
       </p:sp>
@@ -4917,29 +4860,413 @@
         </p:nvSpPr>
         <p:spPr/>
         <p:txBody>
+          <a:bodyPr>
+            <a:normAutofit fontScale="90000"/>
+          </a:bodyPr>
+          <a:lstStyle/>
+          <a:p>
+            <a:r>
+              <a:rPr lang="en-US" sz="2000" dirty="0" smtClean="0">
+                <a:solidFill>
+                  <a:schemeClr val="accent6"/>
+                </a:solidFill>
+              </a:rPr>
+              <a:t/>
+            </a:r>
+            <a:br>
+              <a:rPr lang="en-US" sz="2000" dirty="0" smtClean="0">
+                <a:solidFill>
+                  <a:schemeClr val="accent6"/>
+                </a:solidFill>
+              </a:rPr>
+            </a:br>
+            <a:r>
+              <a:rPr lang="en-US" sz="2000" dirty="0">
+                <a:solidFill>
+                  <a:schemeClr val="accent6"/>
+                </a:solidFill>
+              </a:rPr>
+              <a:t/>
+            </a:r>
+            <a:br>
+              <a:rPr lang="en-US" sz="2000" dirty="0">
+                <a:solidFill>
+                  <a:schemeClr val="accent6"/>
+                </a:solidFill>
+              </a:rPr>
+            </a:br>
+            <a:r>
+              <a:rPr lang="en-US" sz="2000" dirty="0" smtClean="0">
+                <a:solidFill>
+                  <a:schemeClr val="accent6"/>
+                </a:solidFill>
+              </a:rPr>
+              <a:t/>
+            </a:r>
+            <a:br>
+              <a:rPr lang="en-US" sz="2000" dirty="0" smtClean="0">
+                <a:solidFill>
+                  <a:schemeClr val="accent6"/>
+                </a:solidFill>
+              </a:rPr>
+            </a:br>
+            <a:r>
+              <a:rPr lang="en-US" sz="2000" dirty="0">
+                <a:solidFill>
+                  <a:schemeClr val="accent6"/>
+                </a:solidFill>
+              </a:rPr>
+              <a:t/>
+            </a:r>
+            <a:br>
+              <a:rPr lang="en-US" sz="2000" dirty="0">
+                <a:solidFill>
+                  <a:schemeClr val="accent6"/>
+                </a:solidFill>
+              </a:rPr>
+            </a:br>
+            <a:r>
+              <a:rPr lang="en-US" sz="2000" dirty="0" smtClean="0">
+                <a:solidFill>
+                  <a:schemeClr val="accent6"/>
+                </a:solidFill>
+              </a:rPr>
+              <a:t/>
+            </a:r>
+            <a:br>
+              <a:rPr lang="en-US" sz="2000" dirty="0" smtClean="0">
+                <a:solidFill>
+                  <a:schemeClr val="accent6"/>
+                </a:solidFill>
+              </a:rPr>
+            </a:br>
+            <a:r>
+              <a:rPr lang="en-US" sz="2000" dirty="0">
+                <a:solidFill>
+                  <a:schemeClr val="accent6"/>
+                </a:solidFill>
+              </a:rPr>
+              <a:t/>
+            </a:r>
+            <a:br>
+              <a:rPr lang="en-US" sz="2000" dirty="0">
+                <a:solidFill>
+                  <a:schemeClr val="accent6"/>
+                </a:solidFill>
+              </a:rPr>
+            </a:br>
+            <a:r>
+              <a:rPr lang="en-US" sz="2000" dirty="0" smtClean="0">
+                <a:solidFill>
+                  <a:schemeClr val="accent6"/>
+                </a:solidFill>
+              </a:rPr>
+              <a:t/>
+            </a:r>
+            <a:br>
+              <a:rPr lang="en-US" sz="2000" dirty="0" smtClean="0">
+                <a:solidFill>
+                  <a:schemeClr val="accent6"/>
+                </a:solidFill>
+              </a:rPr>
+            </a:br>
+            <a:r>
+              <a:rPr lang="en-US" sz="2000" dirty="0" smtClean="0">
+                <a:solidFill>
+                  <a:schemeClr val="accent6"/>
+                </a:solidFill>
+              </a:rPr>
+              <a:t/>
+            </a:r>
+            <a:br>
+              <a:rPr lang="en-US" sz="2000" dirty="0" smtClean="0">
+                <a:solidFill>
+                  <a:schemeClr val="accent6"/>
+                </a:solidFill>
+              </a:rPr>
+            </a:br>
+            <a:r>
+              <a:rPr lang="en-US" sz="2000" dirty="0">
+                <a:solidFill>
+                  <a:schemeClr val="accent6"/>
+                </a:solidFill>
+              </a:rPr>
+              <a:t/>
+            </a:r>
+            <a:br>
+              <a:rPr lang="en-US" sz="2000" dirty="0">
+                <a:solidFill>
+                  <a:schemeClr val="accent6"/>
+                </a:solidFill>
+              </a:rPr>
+            </a:br>
+            <a:r>
+              <a:rPr lang="en-US" sz="2000" dirty="0" smtClean="0">
+                <a:solidFill>
+                  <a:schemeClr val="accent6"/>
+                </a:solidFill>
+              </a:rPr>
+              <a:t/>
+            </a:r>
+            <a:br>
+              <a:rPr lang="en-US" sz="2000" dirty="0" smtClean="0">
+                <a:solidFill>
+                  <a:schemeClr val="accent6"/>
+                </a:solidFill>
+              </a:rPr>
+            </a:br>
+            <a:r>
+              <a:rPr lang="en-US" sz="2000" dirty="0">
+                <a:solidFill>
+                  <a:schemeClr val="accent6"/>
+                </a:solidFill>
+              </a:rPr>
+              <a:t/>
+            </a:r>
+            <a:br>
+              <a:rPr lang="en-US" sz="2000" dirty="0">
+                <a:solidFill>
+                  <a:schemeClr val="accent6"/>
+                </a:solidFill>
+              </a:rPr>
+            </a:br>
+            <a:r>
+              <a:rPr lang="en-US" sz="2000" dirty="0" smtClean="0">
+                <a:solidFill>
+                  <a:schemeClr val="accent6"/>
+                </a:solidFill>
+              </a:rPr>
+              <a:t/>
+            </a:r>
+            <a:br>
+              <a:rPr lang="en-US" sz="2000" dirty="0" smtClean="0">
+                <a:solidFill>
+                  <a:schemeClr val="accent6"/>
+                </a:solidFill>
+              </a:rPr>
+            </a:br>
+            <a:r>
+              <a:rPr lang="en-US" sz="2000" dirty="0">
+                <a:solidFill>
+                  <a:schemeClr val="accent6"/>
+                </a:solidFill>
+              </a:rPr>
+              <a:t/>
+            </a:r>
+            <a:br>
+              <a:rPr lang="en-US" sz="2000" dirty="0">
+                <a:solidFill>
+                  <a:schemeClr val="accent6"/>
+                </a:solidFill>
+              </a:rPr>
+            </a:br>
+            <a:r>
+              <a:rPr lang="en-US" sz="2000" dirty="0" smtClean="0">
+                <a:solidFill>
+                  <a:schemeClr val="accent6"/>
+                </a:solidFill>
+              </a:rPr>
+              <a:t/>
+            </a:r>
+            <a:br>
+              <a:rPr lang="en-US" sz="2000" dirty="0" smtClean="0">
+                <a:solidFill>
+                  <a:schemeClr val="accent6"/>
+                </a:solidFill>
+              </a:rPr>
+            </a:br>
+            <a:r>
+              <a:rPr lang="en-US" sz="2000" dirty="0">
+                <a:solidFill>
+                  <a:schemeClr val="accent6"/>
+                </a:solidFill>
+              </a:rPr>
+              <a:t/>
+            </a:r>
+            <a:br>
+              <a:rPr lang="en-US" sz="2000" dirty="0">
+                <a:solidFill>
+                  <a:schemeClr val="accent6"/>
+                </a:solidFill>
+              </a:rPr>
+            </a:br>
+            <a:r>
+              <a:rPr lang="en-US" sz="2000" dirty="0" smtClean="0">
+                <a:solidFill>
+                  <a:schemeClr val="accent6"/>
+                </a:solidFill>
+              </a:rPr>
+              <a:t>The ‘logger’ command enables users to write messages to </a:t>
+            </a:r>
+            <a:r>
+              <a:rPr lang="en-US" sz="2000" dirty="0" err="1" smtClean="0">
+                <a:solidFill>
+                  <a:schemeClr val="accent6"/>
+                </a:solidFill>
+              </a:rPr>
+              <a:t>rsyslog</a:t>
+            </a:r>
+            <a:r>
+              <a:rPr lang="en-US" sz="2000" dirty="0" smtClean="0">
+                <a:solidFill>
+                  <a:schemeClr val="accent6"/>
+                </a:solidFill>
+              </a:rPr>
+              <a:t> from the command line. Logger is really useful, when you are writing a script and would like to leave a good message why something happened. </a:t>
+            </a:r>
+            <a:br>
+              <a:rPr lang="en-US" sz="2000" dirty="0" smtClean="0">
+                <a:solidFill>
+                  <a:schemeClr val="accent6"/>
+                </a:solidFill>
+              </a:rPr>
+            </a:br>
+            <a:r>
+              <a:rPr lang="en-US" sz="2000" dirty="0">
+                <a:solidFill>
+                  <a:schemeClr val="accent6"/>
+                </a:solidFill>
+              </a:rPr>
+              <a:t/>
+            </a:r>
+            <a:br>
+              <a:rPr lang="en-US" sz="2000" dirty="0">
+                <a:solidFill>
+                  <a:schemeClr val="accent6"/>
+                </a:solidFill>
+              </a:rPr>
+            </a:br>
+            <a:r>
+              <a:rPr lang="en-US" sz="2000" dirty="0" smtClean="0">
+                <a:solidFill>
+                  <a:schemeClr val="accent6"/>
+                </a:solidFill>
+              </a:rPr>
+              <a:t>Exercises:</a:t>
+            </a:r>
+            <a:br>
+              <a:rPr lang="en-US" sz="2000" dirty="0" smtClean="0">
+                <a:solidFill>
+                  <a:schemeClr val="accent6"/>
+                </a:solidFill>
+              </a:rPr>
+            </a:br>
+            <a:r>
+              <a:rPr lang="en-US" sz="2000" dirty="0" smtClean="0">
+                <a:solidFill>
+                  <a:schemeClr val="accent6"/>
+                </a:solidFill>
+              </a:rPr>
+              <a:t>1. tail –f /</a:t>
+            </a:r>
+            <a:r>
+              <a:rPr lang="en-US" sz="2000" dirty="0" err="1" smtClean="0">
+                <a:solidFill>
+                  <a:schemeClr val="accent6"/>
+                </a:solidFill>
+              </a:rPr>
+              <a:t>var</a:t>
+            </a:r>
+            <a:r>
+              <a:rPr lang="en-US" sz="2000" dirty="0" smtClean="0">
+                <a:solidFill>
+                  <a:schemeClr val="accent6"/>
+                </a:solidFill>
+              </a:rPr>
+              <a:t>/log/messages</a:t>
+            </a:r>
+            <a:br>
+              <a:rPr lang="en-US" sz="2000" dirty="0" smtClean="0">
+                <a:solidFill>
+                  <a:schemeClr val="accent6"/>
+                </a:solidFill>
+              </a:rPr>
+            </a:br>
+            <a:r>
+              <a:rPr lang="en-US" sz="2000" dirty="0" smtClean="0">
+                <a:solidFill>
+                  <a:schemeClr val="accent6"/>
+                </a:solidFill>
+              </a:rPr>
+              <a:t>2.open another shell</a:t>
+            </a:r>
+            <a:br>
+              <a:rPr lang="en-US" sz="2000" dirty="0" smtClean="0">
+                <a:solidFill>
+                  <a:schemeClr val="accent6"/>
+                </a:solidFill>
+              </a:rPr>
+            </a:br>
+            <a:r>
+              <a:rPr lang="en-US" sz="2000" dirty="0" smtClean="0">
+                <a:solidFill>
+                  <a:schemeClr val="accent6"/>
+                </a:solidFill>
+              </a:rPr>
+              <a:t>3. logger </a:t>
+            </a:r>
+            <a:r>
+              <a:rPr lang="en-US" sz="2000" dirty="0" err="1" smtClean="0">
+                <a:solidFill>
+                  <a:schemeClr val="accent6"/>
+                </a:solidFill>
+              </a:rPr>
+              <a:t>ne_obicham_zakuska_bez_banana</a:t>
+            </a:r>
+            <a:r>
+              <a:rPr lang="en-US" sz="2000" dirty="0" smtClean="0">
+                <a:solidFill>
+                  <a:schemeClr val="accent6"/>
+                </a:solidFill>
+              </a:rPr>
+              <a:t/>
+            </a:r>
+            <a:br>
+              <a:rPr lang="en-US" sz="2000" dirty="0" smtClean="0">
+                <a:solidFill>
+                  <a:schemeClr val="accent6"/>
+                </a:solidFill>
+              </a:rPr>
+            </a:br>
+            <a:r>
+              <a:rPr lang="en-US" sz="2000" dirty="0" smtClean="0">
+                <a:solidFill>
+                  <a:schemeClr val="accent6"/>
+                </a:solidFill>
+              </a:rPr>
+              <a:t/>
+            </a:r>
+            <a:br>
+              <a:rPr lang="en-US" sz="2000" dirty="0" smtClean="0">
+                <a:solidFill>
+                  <a:schemeClr val="accent6"/>
+                </a:solidFill>
+              </a:rPr>
+            </a:br>
+            <a:endParaRPr lang="en-US" sz="2000" dirty="0">
+              <a:solidFill>
+                <a:schemeClr val="accent6"/>
+              </a:solidFill>
+            </a:endParaRPr>
+          </a:p>
+        </p:txBody>
+      </p:sp>
+      <p:sp>
+        <p:nvSpPr>
+          <p:cNvPr id="3" name="Content Placeholder 2"/>
+          <p:cNvSpPr>
+            <a:spLocks noGrp="1"/>
+          </p:cNvSpPr>
+          <p:nvPr>
+            <p:ph idx="1"/>
+          </p:nvPr>
+        </p:nvSpPr>
+        <p:spPr/>
+        <p:txBody>
           <a:bodyPr/>
           <a:lstStyle/>
           <a:p>
-            <a:endParaRPr lang="en-US"/>
-          </a:p>
-        </p:txBody>
-      </p:sp>
-      <p:sp>
-        <p:nvSpPr>
-          <p:cNvPr id="3" name="Content Placeholder 2"/>
-          <p:cNvSpPr>
-            <a:spLocks noGrp="1"/>
-          </p:cNvSpPr>
-          <p:nvPr>
-            <p:ph idx="1"/>
-          </p:nvPr>
-        </p:nvSpPr>
-        <p:spPr/>
-        <p:txBody>
-          <a:bodyPr/>
-          <a:lstStyle/>
-          <a:p>
-            <a:endParaRPr lang="en-US"/>
+            <a:endParaRPr lang="en-US" dirty="0"/>
           </a:p>
         </p:txBody>
       </p:sp>
@@ -4947,6 +5274,1051 @@
     <p:extLst>
       <p:ext uri="{BB962C8B-B14F-4D97-AF65-F5344CB8AC3E}">
         <p14:creationId xmlns:p14="http://schemas.microsoft.com/office/powerpoint/2010/main" val="1506389198"/>
+      </p:ext>
+    </p:extLst>
+  </p:cSld>
+  <p:clrMapOvr>
+    <a:masterClrMapping/>
+  </p:clrMapOvr>
+</p:sld>
+</file>
+
+<file path=ppt/slides/slide5.xml><?xml version="1.0" encoding="utf-8"?>
+<p:sld xmlns:a="http://schemas.openxmlformats.org/drawingml/2006/main" xmlns:r="http://schemas.openxmlformats.org/officeDocument/2006/relationships" xmlns:p="http://schemas.openxmlformats.org/presentationml/2006/main">
+  <p:cSld>
+    <p:spTree>
+      <p:nvGrpSpPr>
+        <p:cNvPr id="1" name=""/>
+        <p:cNvGrpSpPr/>
+        <p:nvPr/>
+      </p:nvGrpSpPr>
+      <p:grpSpPr>
+        <a:xfrm>
+          <a:off x="0" y="0"/>
+          <a:ext cx="0" cy="0"/>
+          <a:chOff x="0" y="0"/>
+          <a:chExt cx="0" cy="0"/>
+        </a:xfrm>
+      </p:grpSpPr>
+      <p:sp>
+        <p:nvSpPr>
+          <p:cNvPr id="2" name="Title 1"/>
+          <p:cNvSpPr>
+            <a:spLocks noGrp="1"/>
+          </p:cNvSpPr>
+          <p:nvPr>
+            <p:ph type="title"/>
+          </p:nvPr>
+        </p:nvSpPr>
+        <p:spPr>
+          <a:xfrm>
+            <a:off x="685800" y="-685800"/>
+            <a:ext cx="8229600" cy="5791200"/>
+          </a:xfrm>
+        </p:spPr>
+        <p:txBody>
+          <a:bodyPr>
+            <a:normAutofit/>
+          </a:bodyPr>
+          <a:lstStyle/>
+          <a:p>
+            <a:r>
+              <a:rPr lang="en-US" sz="2000" dirty="0" smtClean="0">
+                <a:solidFill>
+                  <a:schemeClr val="accent6"/>
+                </a:solidFill>
+              </a:rPr>
+              <a:t>Configuring </a:t>
+            </a:r>
+            <a:r>
+              <a:rPr lang="en-US" sz="2000" dirty="0" err="1" smtClean="0">
+                <a:solidFill>
+                  <a:schemeClr val="accent6"/>
+                </a:solidFill>
+              </a:rPr>
+              <a:t>rsyslogd</a:t>
+            </a:r>
+            <a:r>
+              <a:rPr lang="en-US" sz="2000" dirty="0" smtClean="0">
+                <a:solidFill>
+                  <a:schemeClr val="accent6"/>
+                </a:solidFill>
+              </a:rPr>
+              <a:t/>
+            </a:r>
+            <a:br>
+              <a:rPr lang="en-US" sz="2000" dirty="0" smtClean="0">
+                <a:solidFill>
+                  <a:schemeClr val="accent6"/>
+                </a:solidFill>
+              </a:rPr>
+            </a:br>
+            <a:r>
+              <a:rPr lang="en-US" sz="2000" dirty="0" smtClean="0">
+                <a:solidFill>
+                  <a:schemeClr val="accent6"/>
+                </a:solidFill>
+              </a:rPr>
+              <a:t>The configuration file for </a:t>
+            </a:r>
+            <a:r>
+              <a:rPr lang="en-US" sz="2000" dirty="0" err="1" smtClean="0">
+                <a:solidFill>
+                  <a:schemeClr val="accent6"/>
+                </a:solidFill>
+              </a:rPr>
+              <a:t>rsyslogd</a:t>
+            </a:r>
+            <a:r>
+              <a:rPr lang="en-US" sz="2000" dirty="0" smtClean="0">
+                <a:solidFill>
+                  <a:schemeClr val="accent6"/>
+                </a:solidFill>
+              </a:rPr>
+              <a:t> is /</a:t>
+            </a:r>
+            <a:r>
+              <a:rPr lang="en-US" sz="2000" dirty="0" err="1" smtClean="0">
+                <a:solidFill>
+                  <a:schemeClr val="accent6"/>
+                </a:solidFill>
+              </a:rPr>
+              <a:t>etc</a:t>
+            </a:r>
+            <a:r>
+              <a:rPr lang="en-US" sz="2000" dirty="0" smtClean="0">
+                <a:solidFill>
+                  <a:schemeClr val="accent6"/>
+                </a:solidFill>
+              </a:rPr>
+              <a:t>/</a:t>
+            </a:r>
+            <a:r>
+              <a:rPr lang="en-US" sz="2000" dirty="0" err="1" smtClean="0">
+                <a:solidFill>
+                  <a:schemeClr val="accent6"/>
+                </a:solidFill>
+              </a:rPr>
+              <a:t>rsyslog.conf</a:t>
+            </a:r>
+            <a:r>
+              <a:rPr lang="en-US" sz="2000" dirty="0" smtClean="0">
+                <a:solidFill>
+                  <a:schemeClr val="accent6"/>
+                </a:solidFill>
+              </a:rPr>
+              <a:t/>
+            </a:r>
+            <a:br>
+              <a:rPr lang="en-US" sz="2000" dirty="0" smtClean="0">
+                <a:solidFill>
+                  <a:schemeClr val="accent6"/>
+                </a:solidFill>
+              </a:rPr>
+            </a:br>
+            <a:r>
+              <a:rPr lang="en-US" sz="2000" dirty="0" smtClean="0">
+                <a:solidFill>
+                  <a:schemeClr val="accent6"/>
+                </a:solidFill>
+              </a:rPr>
+              <a:t>The most well-known way to filter syslog messages is to use the facility(</a:t>
+            </a:r>
+            <a:r>
+              <a:rPr lang="en-US" sz="2000" dirty="0" err="1" smtClean="0">
+                <a:solidFill>
+                  <a:schemeClr val="accent6"/>
+                </a:solidFill>
+              </a:rPr>
+              <a:t>cathegory</a:t>
+            </a:r>
+            <a:r>
+              <a:rPr lang="en-US" sz="2000" dirty="0" smtClean="0">
+                <a:solidFill>
+                  <a:schemeClr val="accent6"/>
+                </a:solidFill>
+              </a:rPr>
+              <a:t>)/severity(priority) method.</a:t>
+            </a:r>
+            <a:r>
+              <a:rPr lang="en-US" sz="2000" dirty="0">
+                <a:solidFill>
+                  <a:schemeClr val="accent6"/>
+                </a:solidFill>
+              </a:rPr>
+              <a:t/>
+            </a:r>
+            <a:br>
+              <a:rPr lang="en-US" sz="2000" dirty="0">
+                <a:solidFill>
+                  <a:schemeClr val="accent6"/>
+                </a:solidFill>
+              </a:rPr>
+            </a:br>
+            <a:r>
+              <a:rPr lang="en-US" sz="2000" dirty="0" smtClean="0">
+                <a:solidFill>
+                  <a:schemeClr val="accent6"/>
+                </a:solidFill>
+              </a:rPr>
+              <a:t/>
+            </a:r>
+            <a:br>
+              <a:rPr lang="en-US" sz="2000" dirty="0" smtClean="0">
+                <a:solidFill>
+                  <a:schemeClr val="accent6"/>
+                </a:solidFill>
+              </a:rPr>
+            </a:br>
+            <a:r>
+              <a:rPr lang="en-US" sz="2000" dirty="0" smtClean="0">
+                <a:solidFill>
+                  <a:schemeClr val="accent6"/>
+                </a:solidFill>
+              </a:rPr>
+              <a:t/>
+            </a:r>
+            <a:br>
+              <a:rPr lang="en-US" sz="2000" dirty="0" smtClean="0">
+                <a:solidFill>
+                  <a:schemeClr val="accent6"/>
+                </a:solidFill>
+              </a:rPr>
+            </a:br>
+            <a:r>
+              <a:rPr lang="en-US" sz="2000" dirty="0" smtClean="0">
+                <a:solidFill>
+                  <a:schemeClr val="accent6"/>
+                </a:solidFill>
+              </a:rPr>
+              <a:t/>
+            </a:r>
+            <a:br>
+              <a:rPr lang="en-US" sz="2000" dirty="0" smtClean="0">
+                <a:solidFill>
+                  <a:schemeClr val="accent6"/>
+                </a:solidFill>
+              </a:rPr>
+            </a:br>
+            <a:r>
+              <a:rPr lang="en-US" sz="2000" dirty="0">
+                <a:solidFill>
+                  <a:schemeClr val="accent6"/>
+                </a:solidFill>
+              </a:rPr>
+              <a:t/>
+            </a:r>
+            <a:br>
+              <a:rPr lang="en-US" sz="2000" dirty="0">
+                <a:solidFill>
+                  <a:schemeClr val="accent6"/>
+                </a:solidFill>
+              </a:rPr>
+            </a:br>
+            <a:endParaRPr lang="en-US" sz="2000" dirty="0">
+              <a:solidFill>
+                <a:schemeClr val="accent6"/>
+              </a:solidFill>
+            </a:endParaRPr>
+          </a:p>
+        </p:txBody>
+      </p:sp>
+      <p:graphicFrame>
+        <p:nvGraphicFramePr>
+          <p:cNvPr id="6" name="Table 5"/>
+          <p:cNvGraphicFramePr>
+            <a:graphicFrameLocks noGrp="1"/>
+          </p:cNvGraphicFramePr>
+          <p:nvPr>
+            <p:extLst>
+              <p:ext uri="{D42A27DB-BD31-4B8C-83A1-F6EECF244321}">
+                <p14:modId xmlns:p14="http://schemas.microsoft.com/office/powerpoint/2010/main" val="4102841065"/>
+              </p:ext>
+            </p:extLst>
+          </p:nvPr>
+        </p:nvGraphicFramePr>
+        <p:xfrm>
+          <a:off x="1066800" y="2209800"/>
+          <a:ext cx="7162800" cy="4669155"/>
+        </p:xfrm>
+        <a:graphic>
+          <a:graphicData uri="http://schemas.openxmlformats.org/drawingml/2006/table">
+            <a:tbl>
+              <a:tblPr firstRow="1" bandRow="1">
+                <a:tableStyleId>{5C22544A-7EE6-4342-B048-85BDC9FD1C3A}</a:tableStyleId>
+              </a:tblPr>
+              <a:tblGrid>
+                <a:gridCol w="3581400"/>
+                <a:gridCol w="3581400"/>
+              </a:tblGrid>
+              <a:tr h="447675">
+                <a:tc>
+                  <a:txBody>
+                    <a:bodyPr/>
+                    <a:lstStyle/>
+                    <a:p>
+                      <a:r>
+                        <a:rPr lang="en-US" dirty="0" smtClean="0"/>
+                        <a:t>Facility list</a:t>
+                      </a:r>
+                      <a:endParaRPr lang="en-US" dirty="0"/>
+                    </a:p>
+                  </a:txBody>
+                  <a:tcPr/>
+                </a:tc>
+                <a:tc>
+                  <a:txBody>
+                    <a:bodyPr/>
+                    <a:lstStyle/>
+                    <a:p>
+                      <a:r>
+                        <a:rPr lang="en-US" dirty="0" smtClean="0"/>
+                        <a:t>Priority list</a:t>
+                      </a:r>
+                      <a:endParaRPr lang="en-US" dirty="0"/>
+                    </a:p>
+                  </a:txBody>
+                  <a:tcPr/>
+                </a:tc>
+              </a:tr>
+              <a:tr h="447675">
+                <a:tc>
+                  <a:txBody>
+                    <a:bodyPr/>
+                    <a:lstStyle/>
+                    <a:p>
+                      <a:pPr>
+                        <a:buNone/>
+                      </a:pPr>
+                      <a:r>
+                        <a:rPr lang="en-US" dirty="0" smtClean="0"/>
+                        <a:t>Kern</a:t>
+                      </a:r>
+                      <a:endParaRPr lang="en-US" dirty="0"/>
+                    </a:p>
+                  </a:txBody>
+                  <a:tcPr/>
+                </a:tc>
+                <a:tc>
+                  <a:txBody>
+                    <a:bodyPr/>
+                    <a:lstStyle/>
+                    <a:p>
+                      <a:r>
+                        <a:rPr lang="en-US" dirty="0" smtClean="0"/>
+                        <a:t>Debug</a:t>
+                      </a:r>
+                      <a:endParaRPr lang="en-US" dirty="0"/>
+                    </a:p>
+                  </a:txBody>
+                  <a:tcPr/>
+                </a:tc>
+              </a:tr>
+              <a:tr h="447675">
+                <a:tc>
+                  <a:txBody>
+                    <a:bodyPr/>
+                    <a:lstStyle/>
+                    <a:p>
+                      <a:r>
+                        <a:rPr lang="en-US" dirty="0" smtClean="0"/>
+                        <a:t>User</a:t>
+                      </a:r>
+                      <a:endParaRPr lang="en-US" dirty="0"/>
+                    </a:p>
+                  </a:txBody>
+                  <a:tcPr/>
+                </a:tc>
+                <a:tc>
+                  <a:txBody>
+                    <a:bodyPr/>
+                    <a:lstStyle/>
+                    <a:p>
+                      <a:r>
+                        <a:rPr lang="en-US" dirty="0" smtClean="0"/>
+                        <a:t>Info</a:t>
+                      </a:r>
+                      <a:endParaRPr lang="en-US" dirty="0"/>
+                    </a:p>
+                  </a:txBody>
+                  <a:tcPr/>
+                </a:tc>
+              </a:tr>
+              <a:tr h="447675">
+                <a:tc>
+                  <a:txBody>
+                    <a:bodyPr/>
+                    <a:lstStyle/>
+                    <a:p>
+                      <a:r>
+                        <a:rPr lang="en-US" dirty="0" smtClean="0"/>
+                        <a:t>Mail</a:t>
+                      </a:r>
+                      <a:endParaRPr lang="en-US" dirty="0"/>
+                    </a:p>
+                  </a:txBody>
+                  <a:tcPr/>
+                </a:tc>
+                <a:tc>
+                  <a:txBody>
+                    <a:bodyPr/>
+                    <a:lstStyle/>
+                    <a:p>
+                      <a:r>
+                        <a:rPr lang="en-US" dirty="0" smtClean="0"/>
+                        <a:t>Notice</a:t>
+                      </a:r>
+                      <a:endParaRPr lang="en-US" dirty="0"/>
+                    </a:p>
+                  </a:txBody>
+                  <a:tcPr/>
+                </a:tc>
+              </a:tr>
+              <a:tr h="447675">
+                <a:tc>
+                  <a:txBody>
+                    <a:bodyPr/>
+                    <a:lstStyle/>
+                    <a:p>
+                      <a:r>
+                        <a:rPr lang="en-US" dirty="0" err="1" smtClean="0"/>
+                        <a:t>Auth</a:t>
+                      </a:r>
+                      <a:endParaRPr lang="en-US" dirty="0"/>
+                    </a:p>
+                  </a:txBody>
+                  <a:tcPr/>
+                </a:tc>
+                <a:tc>
+                  <a:txBody>
+                    <a:bodyPr/>
+                    <a:lstStyle/>
+                    <a:p>
+                      <a:r>
+                        <a:rPr lang="en-US" dirty="0" smtClean="0"/>
+                        <a:t>Warning</a:t>
+                      </a:r>
+                      <a:endParaRPr lang="en-US" dirty="0"/>
+                    </a:p>
+                  </a:txBody>
+                  <a:tcPr/>
+                </a:tc>
+              </a:tr>
+              <a:tr h="447675">
+                <a:tc>
+                  <a:txBody>
+                    <a:bodyPr/>
+                    <a:lstStyle/>
+                    <a:p>
+                      <a:r>
+                        <a:rPr lang="en-US" dirty="0" smtClean="0"/>
+                        <a:t>Syslog</a:t>
+                      </a:r>
+                      <a:endParaRPr lang="en-US" dirty="0"/>
+                    </a:p>
+                  </a:txBody>
+                  <a:tcPr/>
+                </a:tc>
+                <a:tc>
+                  <a:txBody>
+                    <a:bodyPr/>
+                    <a:lstStyle/>
+                    <a:p>
+                      <a:r>
+                        <a:rPr lang="en-US" dirty="0" smtClean="0"/>
+                        <a:t>Err</a:t>
+                      </a:r>
+                      <a:endParaRPr lang="en-US" dirty="0"/>
+                    </a:p>
+                  </a:txBody>
+                  <a:tcPr/>
+                </a:tc>
+              </a:tr>
+              <a:tr h="447675">
+                <a:tc>
+                  <a:txBody>
+                    <a:bodyPr/>
+                    <a:lstStyle/>
+                    <a:p>
+                      <a:r>
+                        <a:rPr lang="en-US" dirty="0" err="1" smtClean="0"/>
+                        <a:t>Cron</a:t>
+                      </a:r>
+                      <a:endParaRPr lang="en-US" dirty="0"/>
+                    </a:p>
+                  </a:txBody>
+                  <a:tcPr/>
+                </a:tc>
+                <a:tc>
+                  <a:txBody>
+                    <a:bodyPr/>
+                    <a:lstStyle/>
+                    <a:p>
+                      <a:r>
+                        <a:rPr lang="en-US" dirty="0" err="1" smtClean="0"/>
+                        <a:t>Crit</a:t>
+                      </a:r>
+                      <a:endParaRPr lang="en-US" dirty="0"/>
+                    </a:p>
+                  </a:txBody>
+                  <a:tcPr/>
+                </a:tc>
+              </a:tr>
+              <a:tr h="447675">
+                <a:tc>
+                  <a:txBody>
+                    <a:bodyPr/>
+                    <a:lstStyle/>
+                    <a:p>
+                      <a:r>
+                        <a:rPr lang="en-US" dirty="0" smtClean="0"/>
+                        <a:t>ftp</a:t>
+                      </a:r>
+                      <a:endParaRPr lang="en-US" dirty="0"/>
+                    </a:p>
+                  </a:txBody>
+                  <a:tcPr/>
+                </a:tc>
+                <a:tc>
+                  <a:txBody>
+                    <a:bodyPr/>
+                    <a:lstStyle/>
+                    <a:p>
+                      <a:r>
+                        <a:rPr lang="en-US" dirty="0" smtClean="0"/>
+                        <a:t>Alert</a:t>
+                      </a:r>
+                      <a:endParaRPr lang="en-US" dirty="0"/>
+                    </a:p>
+                  </a:txBody>
+                  <a:tcPr/>
+                </a:tc>
+              </a:tr>
+              <a:tr h="447675">
+                <a:tc>
+                  <a:txBody>
+                    <a:bodyPr/>
+                    <a:lstStyle/>
+                    <a:p>
+                      <a:r>
+                        <a:rPr lang="en-US" dirty="0" err="1" smtClean="0"/>
+                        <a:t>auth</a:t>
+                      </a:r>
+                      <a:endParaRPr lang="en-US" dirty="0"/>
+                    </a:p>
+                  </a:txBody>
+                  <a:tcPr/>
+                </a:tc>
+                <a:tc>
+                  <a:txBody>
+                    <a:bodyPr/>
+                    <a:lstStyle/>
+                    <a:p>
+                      <a:r>
+                        <a:rPr lang="en-US" dirty="0" err="1" smtClean="0"/>
+                        <a:t>Emerg</a:t>
+                      </a:r>
+                      <a:endParaRPr lang="en-US" dirty="0"/>
+                    </a:p>
+                  </a:txBody>
+                  <a:tcPr/>
+                </a:tc>
+              </a:tr>
+              <a:tr h="447675">
+                <a:tc>
+                  <a:txBody>
+                    <a:bodyPr/>
+                    <a:lstStyle/>
+                    <a:p>
+                      <a:r>
+                        <a:rPr lang="en-US" dirty="0" smtClean="0"/>
+                        <a:t>The columns are not connected with each other, they are more</a:t>
+                      </a:r>
+                      <a:r>
+                        <a:rPr lang="en-US" baseline="0" dirty="0" smtClean="0"/>
+                        <a:t> like a list !</a:t>
+                      </a:r>
+                      <a:endParaRPr lang="en-US" dirty="0"/>
+                    </a:p>
+                  </a:txBody>
+                  <a:tcPr/>
+                </a:tc>
+                <a:tc>
+                  <a:txBody>
+                    <a:bodyPr/>
+                    <a:lstStyle/>
+                    <a:p>
+                      <a:endParaRPr lang="en-US" dirty="0"/>
+                    </a:p>
+                  </a:txBody>
+                  <a:tcPr/>
+                </a:tc>
+              </a:tr>
+            </a:tbl>
+          </a:graphicData>
+        </a:graphic>
+      </p:graphicFrame>
+    </p:spTree>
+    <p:extLst>
+      <p:ext uri="{BB962C8B-B14F-4D97-AF65-F5344CB8AC3E}">
+        <p14:creationId xmlns:p14="http://schemas.microsoft.com/office/powerpoint/2010/main" val="4121450417"/>
+      </p:ext>
+    </p:extLst>
+  </p:cSld>
+  <p:clrMapOvr>
+    <a:masterClrMapping/>
+  </p:clrMapOvr>
+</p:sld>
+</file>
+
+<file path=ppt/slides/slide6.xml><?xml version="1.0" encoding="utf-8"?>
+<p:sld xmlns:a="http://schemas.openxmlformats.org/drawingml/2006/main" xmlns:r="http://schemas.openxmlformats.org/officeDocument/2006/relationships" xmlns:p="http://schemas.openxmlformats.org/presentationml/2006/main">
+  <p:cSld>
+    <p:spTree>
+      <p:nvGrpSpPr>
+        <p:cNvPr id="1" name=""/>
+        <p:cNvGrpSpPr/>
+        <p:nvPr/>
+      </p:nvGrpSpPr>
+      <p:grpSpPr>
+        <a:xfrm>
+          <a:off x="0" y="0"/>
+          <a:ext cx="0" cy="0"/>
+          <a:chOff x="0" y="0"/>
+          <a:chExt cx="0" cy="0"/>
+        </a:xfrm>
+      </p:grpSpPr>
+      <p:sp>
+        <p:nvSpPr>
+          <p:cNvPr id="2" name="Title 1"/>
+          <p:cNvSpPr>
+            <a:spLocks noGrp="1"/>
+          </p:cNvSpPr>
+          <p:nvPr>
+            <p:ph type="title"/>
+          </p:nvPr>
+        </p:nvSpPr>
+        <p:spPr/>
+        <p:txBody>
+          <a:bodyPr>
+            <a:normAutofit fontScale="90000"/>
+          </a:bodyPr>
+          <a:lstStyle/>
+          <a:p>
+            <a:r>
+              <a:rPr lang="en-US" dirty="0" smtClean="0">
+                <a:solidFill>
+                  <a:schemeClr val="accent6"/>
+                </a:solidFill>
+              </a:rPr>
+              <a:t/>
+            </a:r>
+            <a:br>
+              <a:rPr lang="en-US" dirty="0" smtClean="0">
+                <a:solidFill>
+                  <a:schemeClr val="accent6"/>
+                </a:solidFill>
+              </a:rPr>
+            </a:br>
+            <a:r>
+              <a:rPr lang="en-US" dirty="0">
+                <a:solidFill>
+                  <a:schemeClr val="accent6"/>
+                </a:solidFill>
+              </a:rPr>
+              <a:t/>
+            </a:r>
+            <a:br>
+              <a:rPr lang="en-US" dirty="0">
+                <a:solidFill>
+                  <a:schemeClr val="accent6"/>
+                </a:solidFill>
+              </a:rPr>
+            </a:br>
+            <a:r>
+              <a:rPr lang="en-US" dirty="0" smtClean="0">
+                <a:solidFill>
+                  <a:schemeClr val="accent6"/>
+                </a:solidFill>
+              </a:rPr>
+              <a:t/>
+            </a:r>
+            <a:br>
+              <a:rPr lang="en-US" dirty="0" smtClean="0">
+                <a:solidFill>
+                  <a:schemeClr val="accent6"/>
+                </a:solidFill>
+              </a:rPr>
+            </a:br>
+            <a:r>
+              <a:rPr lang="en-US" dirty="0" smtClean="0">
+                <a:solidFill>
+                  <a:schemeClr val="accent6"/>
+                </a:solidFill>
+              </a:rPr>
+              <a:t/>
+            </a:r>
+            <a:br>
+              <a:rPr lang="en-US" dirty="0" smtClean="0">
+                <a:solidFill>
+                  <a:schemeClr val="accent6"/>
+                </a:solidFill>
+              </a:rPr>
+            </a:br>
+            <a:r>
+              <a:rPr lang="en-US" dirty="0">
+                <a:solidFill>
+                  <a:schemeClr val="accent6"/>
+                </a:solidFill>
+              </a:rPr>
+              <a:t/>
+            </a:r>
+            <a:br>
+              <a:rPr lang="en-US" dirty="0">
+                <a:solidFill>
+                  <a:schemeClr val="accent6"/>
+                </a:solidFill>
+              </a:rPr>
+            </a:br>
+            <a:r>
+              <a:rPr lang="en-US" dirty="0" smtClean="0">
+                <a:solidFill>
+                  <a:schemeClr val="accent6"/>
+                </a:solidFill>
+              </a:rPr>
+              <a:t/>
+            </a:r>
+            <a:br>
+              <a:rPr lang="en-US" dirty="0" smtClean="0">
+                <a:solidFill>
+                  <a:schemeClr val="accent6"/>
+                </a:solidFill>
+              </a:rPr>
+            </a:br>
+            <a:r>
+              <a:rPr lang="en-US" sz="1800" dirty="0" smtClean="0">
+                <a:solidFill>
+                  <a:schemeClr val="accent6"/>
+                </a:solidFill>
+              </a:rPr>
+              <a:t>Examples:</a:t>
+            </a:r>
+            <a:br>
+              <a:rPr lang="en-US" sz="1800" dirty="0" smtClean="0">
+                <a:solidFill>
+                  <a:schemeClr val="accent6"/>
+                </a:solidFill>
+              </a:rPr>
+            </a:br>
+            <a:r>
+              <a:rPr lang="en-US" sz="1800" dirty="0" smtClean="0">
+                <a:solidFill>
+                  <a:schemeClr val="accent6"/>
+                </a:solidFill>
+              </a:rPr>
+              <a:t/>
+            </a:r>
+            <a:br>
+              <a:rPr lang="en-US" sz="1800" dirty="0" smtClean="0">
+                <a:solidFill>
+                  <a:schemeClr val="accent6"/>
+                </a:solidFill>
+              </a:rPr>
+            </a:br>
+            <a:r>
+              <a:rPr lang="en-US" sz="1800" dirty="0" smtClean="0">
+                <a:solidFill>
+                  <a:schemeClr val="accent6"/>
+                </a:solidFill>
+              </a:rPr>
+              <a:t>kern.* =&gt; select all kernel syslog messages with any priority.</a:t>
+            </a:r>
+            <a:br>
+              <a:rPr lang="en-US" sz="1800" dirty="0" smtClean="0">
+                <a:solidFill>
+                  <a:schemeClr val="accent6"/>
+                </a:solidFill>
+              </a:rPr>
+            </a:br>
+            <a:r>
+              <a:rPr lang="en-US" sz="1800" dirty="0" err="1" smtClean="0">
+                <a:solidFill>
+                  <a:schemeClr val="accent6"/>
+                </a:solidFill>
+              </a:rPr>
+              <a:t>Kenr</a:t>
+            </a:r>
+            <a:r>
+              <a:rPr lang="en-US" sz="1800" dirty="0" smtClean="0">
+                <a:solidFill>
+                  <a:schemeClr val="accent6"/>
+                </a:solidFill>
+              </a:rPr>
+              <a:t> = Facility(</a:t>
+            </a:r>
+            <a:r>
+              <a:rPr lang="en-US" sz="1800" dirty="0" err="1" smtClean="0">
+                <a:solidFill>
+                  <a:schemeClr val="accent6"/>
+                </a:solidFill>
+              </a:rPr>
+              <a:t>Cathegory</a:t>
+            </a:r>
+            <a:r>
+              <a:rPr lang="en-US" sz="1800" dirty="0" smtClean="0">
+                <a:solidFill>
+                  <a:schemeClr val="accent6"/>
+                </a:solidFill>
+              </a:rPr>
+              <a:t>)</a:t>
+            </a:r>
+            <a:br>
+              <a:rPr lang="en-US" sz="1800" dirty="0" smtClean="0">
+                <a:solidFill>
+                  <a:schemeClr val="accent6"/>
+                </a:solidFill>
+              </a:rPr>
+            </a:br>
+            <a:r>
+              <a:rPr lang="en-US" sz="1800" dirty="0" smtClean="0">
+                <a:solidFill>
+                  <a:schemeClr val="accent6"/>
+                </a:solidFill>
+              </a:rPr>
+              <a:t>* = Severity(Priority)</a:t>
+            </a:r>
+            <a:br>
+              <a:rPr lang="en-US" sz="1800" dirty="0" smtClean="0">
+                <a:solidFill>
+                  <a:schemeClr val="accent6"/>
+                </a:solidFill>
+              </a:rPr>
+            </a:br>
+            <a:r>
+              <a:rPr lang="en-US" sz="1800" dirty="0">
+                <a:solidFill>
+                  <a:schemeClr val="accent6"/>
+                </a:solidFill>
+              </a:rPr>
+              <a:t/>
+            </a:r>
+            <a:br>
+              <a:rPr lang="en-US" sz="1800" dirty="0">
+                <a:solidFill>
+                  <a:schemeClr val="accent6"/>
+                </a:solidFill>
+              </a:rPr>
+            </a:br>
+            <a:r>
+              <a:rPr lang="en-US" sz="1800" dirty="0" err="1" smtClean="0">
+                <a:solidFill>
+                  <a:schemeClr val="accent6"/>
+                </a:solidFill>
+              </a:rPr>
+              <a:t>mai.crit</a:t>
+            </a:r>
+            <a:r>
+              <a:rPr lang="en-US" sz="1800" dirty="0" smtClean="0">
+                <a:solidFill>
+                  <a:schemeClr val="accent6"/>
+                </a:solidFill>
+              </a:rPr>
+              <a:t> =&gt; All messages from Facility mail with Severity </a:t>
+            </a:r>
+            <a:r>
+              <a:rPr lang="en-US" sz="1800" dirty="0" err="1" smtClean="0">
+                <a:solidFill>
+                  <a:schemeClr val="accent6"/>
+                </a:solidFill>
+              </a:rPr>
+              <a:t>crit</a:t>
+            </a:r>
+            <a:r>
+              <a:rPr lang="en-US" sz="1800" dirty="0" smtClean="0">
+                <a:solidFill>
+                  <a:schemeClr val="accent6"/>
+                </a:solidFill>
+              </a:rPr>
+              <a:t/>
+            </a:r>
+            <a:br>
+              <a:rPr lang="en-US" sz="1800" dirty="0" smtClean="0">
+                <a:solidFill>
+                  <a:schemeClr val="accent6"/>
+                </a:solidFill>
+              </a:rPr>
+            </a:br>
+            <a:r>
+              <a:rPr lang="en-US" sz="1800" dirty="0">
+                <a:solidFill>
+                  <a:schemeClr val="accent6"/>
+                </a:solidFill>
+              </a:rPr>
+              <a:t/>
+            </a:r>
+            <a:br>
+              <a:rPr lang="en-US" sz="1800" dirty="0">
+                <a:solidFill>
+                  <a:schemeClr val="accent6"/>
+                </a:solidFill>
+              </a:rPr>
+            </a:br>
+            <a:r>
+              <a:rPr lang="en-US" sz="1800" dirty="0" err="1" smtClean="0">
+                <a:solidFill>
+                  <a:schemeClr val="accent6"/>
+                </a:solidFill>
+              </a:rPr>
+              <a:t>cron</a:t>
+            </a:r>
+            <a:r>
+              <a:rPr lang="en-US" sz="1800" dirty="0" smtClean="0">
+                <a:solidFill>
+                  <a:schemeClr val="accent6"/>
+                </a:solidFill>
+              </a:rPr>
+              <a:t>.!</a:t>
+            </a:r>
+            <a:r>
+              <a:rPr lang="en-US" sz="1800" dirty="0" err="1" smtClean="0">
+                <a:solidFill>
+                  <a:schemeClr val="accent6"/>
+                </a:solidFill>
+              </a:rPr>
+              <a:t>info,!debug</a:t>
+            </a:r>
+            <a:r>
+              <a:rPr lang="en-US" sz="1800" dirty="0" smtClean="0">
+                <a:solidFill>
+                  <a:schemeClr val="accent6"/>
+                </a:solidFill>
+              </a:rPr>
+              <a:t> =&gt; All messages from Facility </a:t>
+            </a:r>
+            <a:r>
+              <a:rPr lang="en-US" sz="1800" dirty="0" err="1" smtClean="0">
+                <a:solidFill>
+                  <a:schemeClr val="accent6"/>
+                </a:solidFill>
+              </a:rPr>
+              <a:t>cron</a:t>
+            </a:r>
+            <a:r>
+              <a:rPr lang="en-US" sz="1800" dirty="0" smtClean="0">
+                <a:solidFill>
+                  <a:schemeClr val="accent6"/>
+                </a:solidFill>
+              </a:rPr>
+              <a:t> with Severity different than info and debug.</a:t>
+            </a:r>
+            <a:br>
+              <a:rPr lang="en-US" sz="1800" dirty="0" smtClean="0">
+                <a:solidFill>
+                  <a:schemeClr val="accent6"/>
+                </a:solidFill>
+              </a:rPr>
+            </a:br>
+            <a:r>
+              <a:rPr lang="en-US" sz="1800" dirty="0">
+                <a:solidFill>
+                  <a:schemeClr val="accent6"/>
+                </a:solidFill>
+              </a:rPr>
+              <a:t/>
+            </a:r>
+            <a:br>
+              <a:rPr lang="en-US" sz="1800" dirty="0">
+                <a:solidFill>
+                  <a:schemeClr val="accent6"/>
+                </a:solidFill>
+              </a:rPr>
+            </a:br>
+            <a:r>
+              <a:rPr lang="en-US" sz="1800" dirty="0" smtClean="0">
+                <a:solidFill>
+                  <a:schemeClr val="accent6"/>
+                </a:solidFill>
+              </a:rPr>
+              <a:t>Exercise:</a:t>
+            </a:r>
+            <a:br>
+              <a:rPr lang="en-US" sz="1800" dirty="0" smtClean="0">
+                <a:solidFill>
+                  <a:schemeClr val="accent6"/>
+                </a:solidFill>
+              </a:rPr>
+            </a:br>
+            <a:r>
+              <a:rPr lang="en-US" sz="1800" dirty="0" smtClean="0">
+                <a:solidFill>
+                  <a:schemeClr val="accent6"/>
+                </a:solidFill>
+              </a:rPr>
+              <a:t>1. Analyze the below screenshot:</a:t>
+            </a:r>
+            <a:br>
+              <a:rPr lang="en-US" sz="1800" dirty="0" smtClean="0">
+                <a:solidFill>
+                  <a:schemeClr val="accent6"/>
+                </a:solidFill>
+              </a:rPr>
+            </a:br>
+            <a:r>
+              <a:rPr lang="en-US" sz="2200" dirty="0">
+                <a:solidFill>
+                  <a:schemeClr val="accent6"/>
+                </a:solidFill>
+              </a:rPr>
+              <a:t/>
+            </a:r>
+            <a:br>
+              <a:rPr lang="en-US" sz="2200" dirty="0">
+                <a:solidFill>
+                  <a:schemeClr val="accent6"/>
+                </a:solidFill>
+              </a:rPr>
+            </a:br>
+            <a:endParaRPr lang="en-US" sz="2200" dirty="0">
+              <a:solidFill>
+                <a:schemeClr val="accent6"/>
+              </a:solidFill>
+            </a:endParaRPr>
+          </a:p>
+        </p:txBody>
+      </p:sp>
+      <p:pic>
+        <p:nvPicPr>
+          <p:cNvPr id="4" name="Content Placeholder 3"/>
+          <p:cNvPicPr>
+            <a:picLocks noGrp="1" noChangeAspect="1"/>
+          </p:cNvPicPr>
+          <p:nvPr>
+            <p:ph idx="1"/>
+          </p:nvPr>
+        </p:nvPicPr>
+        <p:blipFill>
+          <a:blip r:embed="rId2">
+            <a:extLst>
+              <a:ext uri="{28A0092B-C50C-407E-A947-70E740481C1C}">
+                <a14:useLocalDpi xmlns:a14="http://schemas.microsoft.com/office/drawing/2010/main" val="0"/>
+              </a:ext>
+            </a:extLst>
+          </a:blip>
+          <a:stretch>
+            <a:fillRect/>
+          </a:stretch>
+        </p:blipFill>
+        <p:spPr>
+          <a:xfrm>
+            <a:off x="1600200" y="4038599"/>
+            <a:ext cx="6400800" cy="2578213"/>
+          </a:xfrm>
+        </p:spPr>
+      </p:pic>
+    </p:spTree>
+    <p:extLst>
+      <p:ext uri="{BB962C8B-B14F-4D97-AF65-F5344CB8AC3E}">
+        <p14:creationId xmlns:p14="http://schemas.microsoft.com/office/powerpoint/2010/main" val="3513198002"/>
       </p:ext>
     </p:extLst>
   </p:cSld>

</xml_diff>

<commit_message>
Fixing presentation typos and colors.
</commit_message>
<xml_diff>
--- a/11.Logging/11-Logging.pptx
+++ b/11.Logging/11-Logging.pptx
@@ -136,11 +136,7 @@
 <file path=ppt/commentAuthors.xml><?xml version="1.0" encoding="utf-8"?>
 <p:cmAuthorLst xmlns:a="http://schemas.openxmlformats.org/drawingml/2006/main" xmlns:r="http://schemas.openxmlformats.org/officeDocument/2006/relationships" xmlns:p="http://schemas.openxmlformats.org/presentationml/2006/main">
   <p:cmAuthor id="1" name="Belichev, Iliya" initials="BI" lastIdx="1" clrIdx="0">
-    <p:extLst>
-      <p:ext uri="{19B8F6BF-5375-455C-9EA6-DF929625EA0E}">
-        <p15:presenceInfo xmlns:p15="http://schemas.microsoft.com/office/powerpoint/2012/main" userId="S-1-5-21-1957994488-842925246-40105171-1920375" providerId="AD"/>
-      </p:ext>
-    </p:extLst>
+    <p:extLst/>
   </p:cmAuthor>
 </p:cmAuthorLst>
 </file>
@@ -227,7 +223,7 @@
           <a:p>
             <a:fld id="{75861919-8521-4274-BB91-998CD62CEE44}" type="datetimeFigureOut">
               <a:rPr lang="en-US" smtClean="0"/>
-              <a:t>12/21/2016</a:t>
+              <a:t>3/24/17</a:t>
             </a:fld>
             <a:endParaRPr lang="en-US"/>
           </a:p>
@@ -676,7 +672,7 @@
           <a:p>
             <a:fld id="{3EA744D9-3FBE-48D8-BF2A-85DF203E4D20}" type="datetimeFigureOut">
               <a:rPr lang="bg-BG" smtClean="0"/>
-              <a:t>21.12.2016 г.</a:t>
+              <a:t>24.03.17 г.</a:t>
             </a:fld>
             <a:endParaRPr lang="bg-BG"/>
           </a:p>
@@ -846,7 +842,7 @@
           <a:p>
             <a:fld id="{3EA744D9-3FBE-48D8-BF2A-85DF203E4D20}" type="datetimeFigureOut">
               <a:rPr lang="bg-BG" smtClean="0"/>
-              <a:t>21.12.2016 г.</a:t>
+              <a:t>24.03.17 г.</a:t>
             </a:fld>
             <a:endParaRPr lang="bg-BG"/>
           </a:p>
@@ -1026,7 +1022,7 @@
           <a:p>
             <a:fld id="{3EA744D9-3FBE-48D8-BF2A-85DF203E4D20}" type="datetimeFigureOut">
               <a:rPr lang="bg-BG" smtClean="0"/>
-              <a:t>21.12.2016 г.</a:t>
+              <a:t>24.03.17 г.</a:t>
             </a:fld>
             <a:endParaRPr lang="bg-BG"/>
           </a:p>
@@ -1196,7 +1192,7 @@
           <a:p>
             <a:fld id="{3EA744D9-3FBE-48D8-BF2A-85DF203E4D20}" type="datetimeFigureOut">
               <a:rPr lang="bg-BG" smtClean="0"/>
-              <a:t>21.12.2016 г.</a:t>
+              <a:t>24.03.17 г.</a:t>
             </a:fld>
             <a:endParaRPr lang="bg-BG"/>
           </a:p>
@@ -1442,7 +1438,7 @@
           <a:p>
             <a:fld id="{3EA744D9-3FBE-48D8-BF2A-85DF203E4D20}" type="datetimeFigureOut">
               <a:rPr lang="bg-BG" smtClean="0"/>
-              <a:t>21.12.2016 г.</a:t>
+              <a:t>24.03.17 г.</a:t>
             </a:fld>
             <a:endParaRPr lang="bg-BG"/>
           </a:p>
@@ -1730,7 +1726,7 @@
           <a:p>
             <a:fld id="{3EA744D9-3FBE-48D8-BF2A-85DF203E4D20}" type="datetimeFigureOut">
               <a:rPr lang="bg-BG" smtClean="0"/>
-              <a:t>21.12.2016 г.</a:t>
+              <a:t>24.03.17 г.</a:t>
             </a:fld>
             <a:endParaRPr lang="bg-BG"/>
           </a:p>
@@ -2152,7 +2148,7 @@
           <a:p>
             <a:fld id="{3EA744D9-3FBE-48D8-BF2A-85DF203E4D20}" type="datetimeFigureOut">
               <a:rPr lang="bg-BG" smtClean="0"/>
-              <a:t>21.12.2016 г.</a:t>
+              <a:t>24.03.17 г.</a:t>
             </a:fld>
             <a:endParaRPr lang="bg-BG"/>
           </a:p>
@@ -2270,7 +2266,7 @@
           <a:p>
             <a:fld id="{3EA744D9-3FBE-48D8-BF2A-85DF203E4D20}" type="datetimeFigureOut">
               <a:rPr lang="bg-BG" smtClean="0"/>
-              <a:t>21.12.2016 г.</a:t>
+              <a:t>24.03.17 г.</a:t>
             </a:fld>
             <a:endParaRPr lang="bg-BG"/>
           </a:p>
@@ -2365,7 +2361,7 @@
           <a:p>
             <a:fld id="{3EA744D9-3FBE-48D8-BF2A-85DF203E4D20}" type="datetimeFigureOut">
               <a:rPr lang="bg-BG" smtClean="0"/>
-              <a:t>21.12.2016 г.</a:t>
+              <a:t>24.03.17 г.</a:t>
             </a:fld>
             <a:endParaRPr lang="bg-BG"/>
           </a:p>
@@ -2642,7 +2638,7 @@
           <a:p>
             <a:fld id="{3EA744D9-3FBE-48D8-BF2A-85DF203E4D20}" type="datetimeFigureOut">
               <a:rPr lang="bg-BG" smtClean="0"/>
-              <a:t>21.12.2016 г.</a:t>
+              <a:t>24.03.17 г.</a:t>
             </a:fld>
             <a:endParaRPr lang="bg-BG"/>
           </a:p>
@@ -2895,7 +2891,7 @@
           <a:p>
             <a:fld id="{3EA744D9-3FBE-48D8-BF2A-85DF203E4D20}" type="datetimeFigureOut">
               <a:rPr lang="bg-BG" smtClean="0"/>
-              <a:t>21.12.2016 г.</a:t>
+              <a:t>24.03.17 г.</a:t>
             </a:fld>
             <a:endParaRPr lang="bg-BG"/>
           </a:p>
@@ -3117,7 +3113,7 @@
           <a:p>
             <a:fld id="{3EA744D9-3FBE-48D8-BF2A-85DF203E4D20}" type="datetimeFigureOut">
               <a:rPr lang="bg-BG" smtClean="0"/>
-              <a:t>21.12.2016 г.</a:t>
+              <a:t>24.03.17 г.</a:t>
             </a:fld>
             <a:endParaRPr lang="bg-BG"/>
           </a:p>
@@ -3681,7 +3677,7 @@
             <a:r>
               <a:rPr lang="en-US" dirty="0" err="1" smtClean="0">
                 <a:solidFill>
-                  <a:schemeClr val="accent6"/>
+                  <a:schemeClr val="bg2"/>
                 </a:solidFill>
               </a:rPr>
               <a:t>rsyslogd</a:t>
@@ -3689,10 +3685,18 @@
             <a:r>
               <a:rPr lang="en-US" dirty="0" smtClean="0">
                 <a:solidFill>
-                  <a:schemeClr val="accent6"/>
-                </a:solidFill>
-              </a:rPr>
-              <a:t> =&gt; A service that takes care of managing centralized log files.</a:t>
+                  <a:schemeClr val="bg2"/>
+                </a:solidFill>
+              </a:rPr>
+              <a:t> </a:t>
+            </a:r>
+            <a:r>
+              <a:rPr lang="en-US" dirty="0" smtClean="0">
+                <a:solidFill>
+                  <a:schemeClr val="accent6"/>
+                </a:solidFill>
+              </a:rPr>
+              <a:t>=&gt; A service that takes care of managing centralized log files.</a:t>
             </a:r>
           </a:p>
           <a:p>
@@ -3702,7 +3706,7 @@
             <a:r>
               <a:rPr lang="en-US" dirty="0" err="1">
                 <a:solidFill>
-                  <a:schemeClr val="accent6"/>
+                  <a:schemeClr val="bg2"/>
                 </a:solidFill>
               </a:rPr>
               <a:t>j</a:t>
@@ -3710,7 +3714,7 @@
             <a:r>
               <a:rPr lang="en-US" dirty="0" err="1" smtClean="0">
                 <a:solidFill>
-                  <a:schemeClr val="accent6"/>
+                  <a:schemeClr val="bg2"/>
                 </a:solidFill>
               </a:rPr>
               <a:t>ournald</a:t>
@@ -3915,10 +3919,18 @@
             <a:r>
               <a:rPr lang="en-US" dirty="0" smtClean="0">
                 <a:solidFill>
-                  <a:schemeClr val="accent6"/>
-                </a:solidFill>
-              </a:rPr>
-              <a:t>Exercises:</a:t>
+                  <a:srgbClr val="FF0000"/>
+                </a:solidFill>
+              </a:rPr>
+              <a:t>Exercises</a:t>
+            </a:r>
+            <a:r>
+              <a:rPr lang="en-US" dirty="0" smtClean="0">
+                <a:solidFill>
+                  <a:schemeClr val="accent6"/>
+                </a:solidFill>
+              </a:rPr>
+              <a:t>:</a:t>
             </a:r>
           </a:p>
           <a:p>
@@ -3939,7 +3951,23 @@
                   <a:schemeClr val="accent6"/>
                 </a:solidFill>
               </a:rPr>
-              <a:t> to tour classmates in how many ways the logging is done in Linux?</a:t>
+              <a:t> to </a:t>
+            </a:r>
+            <a:r>
+              <a:rPr lang="en-US" dirty="0" smtClean="0">
+                <a:solidFill>
+                  <a:schemeClr val="accent6"/>
+                </a:solidFill>
+              </a:rPr>
+              <a:t>your </a:t>
+            </a:r>
+            <a:r>
+              <a:rPr lang="en-US" dirty="0" smtClean="0">
+                <a:solidFill>
+                  <a:schemeClr val="accent6"/>
+                </a:solidFill>
+              </a:rPr>
+              <a:t>classmates in how many ways the logging is done in Linux?</a:t>
             </a:r>
             <a:endParaRPr lang="en-US" dirty="0">
               <a:solidFill>
@@ -4717,12 +4745,20 @@
                   <a:schemeClr val="accent6"/>
                 </a:solidFill>
               </a:rPr>
-              <a:t>1. tail –n 20 /</a:t>
+              <a:t>1. </a:t>
+            </a:r>
+            <a:r>
+              <a:rPr lang="en-US" sz="2200" dirty="0" smtClean="0">
+                <a:solidFill>
+                  <a:schemeClr val="bg1"/>
+                </a:solidFill>
+              </a:rPr>
+              <a:t>tail –n 20 /</a:t>
             </a:r>
             <a:r>
               <a:rPr lang="en-US" sz="2200" dirty="0" err="1" smtClean="0">
                 <a:solidFill>
-                  <a:schemeClr val="accent6"/>
+                  <a:schemeClr val="bg1"/>
                 </a:solidFill>
               </a:rPr>
               <a:t>var</a:t>
@@ -4730,24 +4766,32 @@
             <a:r>
               <a:rPr lang="en-US" sz="2200" dirty="0" smtClean="0">
                 <a:solidFill>
-                  <a:schemeClr val="accent6"/>
+                  <a:schemeClr val="bg1"/>
                 </a:solidFill>
               </a:rPr>
               <a:t>/log/messages</a:t>
             </a:r>
-            <a:br>
+            <a:r>
               <a:rPr lang="en-US" sz="2200" dirty="0" smtClean="0">
                 <a:solidFill>
                   <a:schemeClr val="accent6"/>
                 </a:solidFill>
               </a:rPr>
-            </a:br>
-            <a:r>
+              <a:t/>
+            </a:r>
+            <a:br>
               <a:rPr lang="en-US" sz="2200" dirty="0" smtClean="0">
                 <a:solidFill>
                   <a:schemeClr val="accent6"/>
                 </a:solidFill>
               </a:rPr>
+            </a:br>
+            <a:r>
+              <a:rPr lang="en-US" sz="2200" dirty="0" smtClean="0">
+                <a:solidFill>
+                  <a:schemeClr val="accent6"/>
+                </a:solidFill>
+              </a:rPr>
               <a:t>2. Analyze a log line.</a:t>
             </a:r>
             <a:br>
@@ -4778,12 +4822,20 @@
                   <a:schemeClr val="accent6"/>
                 </a:solidFill>
               </a:rPr>
-              <a:t>3. tail –f /</a:t>
+              <a:t>3. </a:t>
+            </a:r>
+            <a:r>
+              <a:rPr lang="en-US" sz="2200" dirty="0" smtClean="0">
+                <a:solidFill>
+                  <a:schemeClr val="bg1"/>
+                </a:solidFill>
+              </a:rPr>
+              <a:t>tail –f /</a:t>
             </a:r>
             <a:r>
               <a:rPr lang="en-US" sz="2200" dirty="0" err="1" smtClean="0">
                 <a:solidFill>
-                  <a:schemeClr val="accent6"/>
+                  <a:schemeClr val="bg1"/>
                 </a:solidFill>
               </a:rPr>
               <a:t>var</a:t>
@@ -4791,15 +4843,23 @@
             <a:r>
               <a:rPr lang="en-US" sz="2200" dirty="0" smtClean="0">
                 <a:solidFill>
-                  <a:schemeClr val="accent6"/>
-                </a:solidFill>
-              </a:rPr>
-              <a:t>/log/audit/audit.log ; open another process =&gt; </a:t>
+                  <a:schemeClr val="bg1"/>
+                </a:solidFill>
+              </a:rPr>
+              <a:t>/log/audit/audit.log </a:t>
+            </a:r>
+            <a:r>
+              <a:rPr lang="en-US" sz="2200" dirty="0" smtClean="0">
+                <a:solidFill>
+                  <a:schemeClr val="accent6"/>
+                </a:solidFill>
+              </a:rPr>
+              <a:t>; open another process =&gt; </a:t>
             </a:r>
             <a:r>
               <a:rPr lang="en-US" sz="2200" dirty="0" err="1" smtClean="0">
                 <a:solidFill>
-                  <a:schemeClr val="accent6"/>
+                  <a:schemeClr val="bg1"/>
                 </a:solidFill>
               </a:rPr>
               <a:t>ssh</a:t>
@@ -4807,10 +4867,18 @@
             <a:r>
               <a:rPr lang="en-US" sz="2200" dirty="0" smtClean="0">
                 <a:solidFill>
-                  <a:schemeClr val="accent6"/>
-                </a:solidFill>
-              </a:rPr>
-              <a:t> localhost; what happened ?  </a:t>
+                  <a:schemeClr val="bg1"/>
+                </a:solidFill>
+              </a:rPr>
+              <a:t> localhost</a:t>
+            </a:r>
+            <a:r>
+              <a:rPr lang="en-US" sz="2200" dirty="0" smtClean="0">
+                <a:solidFill>
+                  <a:schemeClr val="accent6"/>
+                </a:solidFill>
+              </a:rPr>
+              <a:t>; what happened ?  </a:t>
             </a:r>
             <a:endParaRPr lang="en-US" sz="2200" dirty="0">
               <a:solidFill>
@@ -4852,7 +4920,7 @@
       </p:grpSpPr>
       <p:sp>
         <p:nvSpPr>
-          <p:cNvPr id="2" name="Title 1"/>
+          <p:cNvPr id="5" name="Title 1"/>
           <p:cNvSpPr>
             <a:spLocks noGrp="1"/>
           </p:cNvSpPr>
@@ -5141,30 +5209,46 @@
             <a:r>
               <a:rPr lang="en-US" sz="2000" dirty="0" smtClean="0">
                 <a:solidFill>
-                  <a:schemeClr val="accent6"/>
+                  <a:srgbClr val="FF0000"/>
                 </a:solidFill>
               </a:rPr>
               <a:t>Exercises:</a:t>
             </a:r>
-            <a:br>
+            <a:r>
               <a:rPr lang="en-US" sz="2000" dirty="0" smtClean="0">
                 <a:solidFill>
                   <a:schemeClr val="accent6"/>
                 </a:solidFill>
               </a:rPr>
-            </a:br>
-            <a:r>
+              <a:t/>
+            </a:r>
+            <a:br>
               <a:rPr lang="en-US" sz="2000" dirty="0" smtClean="0">
                 <a:solidFill>
                   <a:schemeClr val="accent6"/>
                 </a:solidFill>
               </a:rPr>
-              <a:t>1. tail –f /</a:t>
+            </a:br>
+            <a:r>
+              <a:rPr lang="en-US" sz="2000" dirty="0" smtClean="0">
+                <a:solidFill>
+                  <a:schemeClr val="accent6"/>
+                </a:solidFill>
+              </a:rPr>
+              <a:t>1. </a:t>
+            </a:r>
+            <a:r>
+              <a:rPr lang="en-US" sz="2000" dirty="0" smtClean="0">
+                <a:solidFill>
+                  <a:schemeClr val="bg2"/>
+                </a:solidFill>
+              </a:rPr>
+              <a:t>tail –f /</a:t>
             </a:r>
             <a:r>
               <a:rPr lang="en-US" sz="2000" dirty="0" err="1" smtClean="0">
                 <a:solidFill>
-                  <a:schemeClr val="accent6"/>
+                  <a:schemeClr val="bg2"/>
                 </a:solidFill>
               </a:rPr>
               <a:t>var</a:t>
@@ -5172,24 +5256,32 @@
             <a:r>
               <a:rPr lang="en-US" sz="2000" dirty="0" smtClean="0">
                 <a:solidFill>
-                  <a:schemeClr val="accent6"/>
+                  <a:schemeClr val="bg2"/>
                 </a:solidFill>
               </a:rPr>
               <a:t>/log/messages</a:t>
             </a:r>
-            <a:br>
+            <a:r>
               <a:rPr lang="en-US" sz="2000" dirty="0" smtClean="0">
                 <a:solidFill>
                   <a:schemeClr val="accent6"/>
                 </a:solidFill>
               </a:rPr>
-            </a:br>
-            <a:r>
+              <a:t/>
+            </a:r>
+            <a:br>
               <a:rPr lang="en-US" sz="2000" dirty="0" smtClean="0">
                 <a:solidFill>
                   <a:schemeClr val="accent6"/>
                 </a:solidFill>
               </a:rPr>
+            </a:br>
+            <a:r>
+              <a:rPr lang="en-US" sz="2000" dirty="0" smtClean="0">
+                <a:solidFill>
+                  <a:schemeClr val="accent6"/>
+                </a:solidFill>
+              </a:rPr>
               <a:t>2.open another shell</a:t>
             </a:r>
             <a:br>
@@ -5205,12 +5297,20 @@
                   <a:schemeClr val="accent6"/>
                 </a:solidFill>
               </a:rPr>
-              <a:t>3. logger </a:t>
+              <a:t>3. </a:t>
+            </a:r>
+            <a:r>
+              <a:rPr lang="en-US" sz="2000" dirty="0" smtClean="0">
+                <a:solidFill>
+                  <a:schemeClr val="bg2"/>
+                </a:solidFill>
+              </a:rPr>
+              <a:t>logger </a:t>
             </a:r>
             <a:r>
               <a:rPr lang="en-US" sz="2000" dirty="0" err="1" smtClean="0">
                 <a:solidFill>
-                  <a:schemeClr val="accent6"/>
+                  <a:schemeClr val="bg2"/>
                 </a:solidFill>
               </a:rPr>
               <a:t>ne_obicham_zakuska_bez_banana</a:t>
@@ -5250,25 +5350,6 @@
                 <a:schemeClr val="accent6"/>
               </a:solidFill>
             </a:endParaRPr>
-          </a:p>
-        </p:txBody>
-      </p:sp>
-      <p:sp>
-        <p:nvSpPr>
-          <p:cNvPr id="3" name="Content Placeholder 2"/>
-          <p:cNvSpPr>
-            <a:spLocks noGrp="1"/>
-          </p:cNvSpPr>
-          <p:nvPr>
-            <p:ph idx="1"/>
-          </p:nvPr>
-        </p:nvSpPr>
-        <p:spPr/>
-        <p:txBody>
-          <a:bodyPr/>
-          <a:lstStyle/>
-          <a:p>
-            <a:endParaRPr lang="en-US" dirty="0"/>
           </a:p>
         </p:txBody>
       </p:sp>
@@ -5302,229 +5383,6 @@
           <a:chExt cx="0" cy="0"/>
         </a:xfrm>
       </p:grpSpPr>
-      <p:sp>
-        <p:nvSpPr>
-          <p:cNvPr id="2" name="Title 1"/>
-          <p:cNvSpPr>
-            <a:spLocks noGrp="1"/>
-          </p:cNvSpPr>
-          <p:nvPr>
-            <p:ph type="title"/>
-          </p:nvPr>
-        </p:nvSpPr>
-        <p:spPr>
-          <a:xfrm>
-            <a:off x="685800" y="-685800"/>
-            <a:ext cx="8229600" cy="5791200"/>
-          </a:xfrm>
-        </p:spPr>
-        <p:txBody>
-          <a:bodyPr>
-            <a:normAutofit/>
-          </a:bodyPr>
-          <a:lstStyle/>
-          <a:p>
-            <a:r>
-              <a:rPr lang="en-US" sz="2000" dirty="0" smtClean="0">
-                <a:solidFill>
-                  <a:schemeClr val="accent6"/>
-                </a:solidFill>
-              </a:rPr>
-              <a:t>Configuring </a:t>
-            </a:r>
-            <a:r>
-              <a:rPr lang="en-US" sz="2000" dirty="0" err="1" smtClean="0">
-                <a:solidFill>
-                  <a:schemeClr val="accent6"/>
-                </a:solidFill>
-              </a:rPr>
-              <a:t>rsyslogd</a:t>
-            </a:r>
-            <a:r>
-              <a:rPr lang="en-US" sz="2000" dirty="0" smtClean="0">
-                <a:solidFill>
-                  <a:schemeClr val="accent6"/>
-                </a:solidFill>
-              </a:rPr>
-              <a:t/>
-            </a:r>
-            <a:br>
-              <a:rPr lang="en-US" sz="2000" dirty="0" smtClean="0">
-                <a:solidFill>
-                  <a:schemeClr val="accent6"/>
-                </a:solidFill>
-              </a:rPr>
-            </a:br>
-            <a:r>
-              <a:rPr lang="en-US" sz="2000" dirty="0" smtClean="0">
-                <a:solidFill>
-                  <a:schemeClr val="accent6"/>
-                </a:solidFill>
-              </a:rPr>
-              <a:t>The configuration file for </a:t>
-            </a:r>
-            <a:r>
-              <a:rPr lang="en-US" sz="2000" dirty="0" err="1" smtClean="0">
-                <a:solidFill>
-                  <a:schemeClr val="accent6"/>
-                </a:solidFill>
-              </a:rPr>
-              <a:t>rsyslogd</a:t>
-            </a:r>
-            <a:r>
-              <a:rPr lang="en-US" sz="2000" dirty="0" smtClean="0">
-                <a:solidFill>
-                  <a:schemeClr val="accent6"/>
-                </a:solidFill>
-              </a:rPr>
-              <a:t> is /</a:t>
-            </a:r>
-            <a:r>
-              <a:rPr lang="en-US" sz="2000" dirty="0" err="1" smtClean="0">
-                <a:solidFill>
-                  <a:schemeClr val="accent6"/>
-                </a:solidFill>
-              </a:rPr>
-              <a:t>etc</a:t>
-            </a:r>
-            <a:r>
-              <a:rPr lang="en-US" sz="2000" dirty="0" smtClean="0">
-                <a:solidFill>
-                  <a:schemeClr val="accent6"/>
-                </a:solidFill>
-              </a:rPr>
-              <a:t>/</a:t>
-            </a:r>
-            <a:r>
-              <a:rPr lang="en-US" sz="2000" dirty="0" err="1" smtClean="0">
-                <a:solidFill>
-                  <a:schemeClr val="accent6"/>
-                </a:solidFill>
-              </a:rPr>
-              <a:t>rsyslog.conf</a:t>
-            </a:r>
-            <a:r>
-              <a:rPr lang="en-US" sz="2000" dirty="0" smtClean="0">
-                <a:solidFill>
-                  <a:schemeClr val="accent6"/>
-                </a:solidFill>
-              </a:rPr>
-              <a:t/>
-            </a:r>
-            <a:br>
-              <a:rPr lang="en-US" sz="2000" dirty="0" smtClean="0">
-                <a:solidFill>
-                  <a:schemeClr val="accent6"/>
-                </a:solidFill>
-              </a:rPr>
-            </a:br>
-            <a:r>
-              <a:rPr lang="en-US" sz="2000" dirty="0" smtClean="0">
-                <a:solidFill>
-                  <a:schemeClr val="accent6"/>
-                </a:solidFill>
-              </a:rPr>
-              <a:t>The most well-known way to filter syslog messages is to use the facility(</a:t>
-            </a:r>
-            <a:r>
-              <a:rPr lang="en-US" sz="2000" dirty="0" err="1" smtClean="0">
-                <a:solidFill>
-                  <a:schemeClr val="accent6"/>
-                </a:solidFill>
-              </a:rPr>
-              <a:t>cathegory</a:t>
-            </a:r>
-            <a:r>
-              <a:rPr lang="en-US" sz="2000" dirty="0" smtClean="0">
-                <a:solidFill>
-                  <a:schemeClr val="accent6"/>
-                </a:solidFill>
-              </a:rPr>
-              <a:t>)/severity(priority) method.</a:t>
-            </a:r>
-            <a:r>
-              <a:rPr lang="en-US" sz="2000" dirty="0">
-                <a:solidFill>
-                  <a:schemeClr val="accent6"/>
-                </a:solidFill>
-              </a:rPr>
-              <a:t/>
-            </a:r>
-            <a:br>
-              <a:rPr lang="en-US" sz="2000" dirty="0">
-                <a:solidFill>
-                  <a:schemeClr val="accent6"/>
-                </a:solidFill>
-              </a:rPr>
-            </a:br>
-            <a:r>
-              <a:rPr lang="en-US" sz="2000" dirty="0" smtClean="0">
-                <a:solidFill>
-                  <a:schemeClr val="accent6"/>
-                </a:solidFill>
-              </a:rPr>
-              <a:t/>
-            </a:r>
-            <a:br>
-              <a:rPr lang="en-US" sz="2000" dirty="0" smtClean="0">
-                <a:solidFill>
-                  <a:schemeClr val="accent6"/>
-                </a:solidFill>
-              </a:rPr>
-            </a:br>
-            <a:r>
-              <a:rPr lang="en-US" sz="2000" dirty="0" smtClean="0">
-                <a:solidFill>
-                  <a:schemeClr val="accent6"/>
-                </a:solidFill>
-              </a:rPr>
-              <a:t/>
-            </a:r>
-            <a:br>
-              <a:rPr lang="en-US" sz="2000" dirty="0" smtClean="0">
-                <a:solidFill>
-                  <a:schemeClr val="accent6"/>
-                </a:solidFill>
-              </a:rPr>
-            </a:br>
-            <a:r>
-              <a:rPr lang="en-US" sz="2000" dirty="0" smtClean="0">
-                <a:solidFill>
-                  <a:schemeClr val="accent6"/>
-                </a:solidFill>
-              </a:rPr>
-              <a:t/>
-            </a:r>
-            <a:br>
-              <a:rPr lang="en-US" sz="2000" dirty="0" smtClean="0">
-                <a:solidFill>
-                  <a:schemeClr val="accent6"/>
-                </a:solidFill>
-              </a:rPr>
-            </a:br>
-            <a:r>
-              <a:rPr lang="en-US" sz="2000" dirty="0">
-                <a:solidFill>
-                  <a:schemeClr val="accent6"/>
-                </a:solidFill>
-              </a:rPr>
-              <a:t/>
-            </a:r>
-            <a:br>
-              <a:rPr lang="en-US" sz="2000" dirty="0">
-                <a:solidFill>
-                  <a:schemeClr val="accent6"/>
-                </a:solidFill>
-              </a:rPr>
-            </a:br>
-            <a:endParaRPr lang="en-US" sz="2000" dirty="0">
-              <a:solidFill>
-                <a:schemeClr val="accent6"/>
-              </a:solidFill>
-            </a:endParaRPr>
-          </a:p>
-        </p:txBody>
-      </p:sp>
       <p:graphicFrame>
         <p:nvGraphicFramePr>
           <p:cNvPr id="6" name="Table 5"/>
@@ -5534,14 +5392,14 @@
           <p:nvPr>
             <p:extLst>
               <p:ext uri="{D42A27DB-BD31-4B8C-83A1-F6EECF244321}">
-                <p14:modId xmlns:p14="http://schemas.microsoft.com/office/powerpoint/2010/main" val="4102841065"/>
+                <p14:modId xmlns:p14="http://schemas.microsoft.com/office/powerpoint/2010/main" val="1696504813"/>
               </p:ext>
             </p:extLst>
           </p:nvPr>
         </p:nvGraphicFramePr>
         <p:xfrm>
-          <a:off x="1066800" y="2209800"/>
-          <a:ext cx="7162800" cy="4669155"/>
+          <a:off x="1066800" y="2209801"/>
+          <a:ext cx="7162800" cy="4702815"/>
         </p:xfrm>
         <a:graphic>
           <a:graphicData uri="http://schemas.openxmlformats.org/drawingml/2006/table">
@@ -5550,10 +5408,10 @@
                 <a:tableStyleId>{5C22544A-7EE6-4342-B048-85BDC9FD1C3A}</a:tableStyleId>
               </a:tblPr>
               <a:tblGrid>
-                <a:gridCol w="3581400"/>
-                <a:gridCol w="3581400"/>
+                <a:gridCol w="3505200"/>
+                <a:gridCol w="3657600"/>
               </a:tblGrid>
-              <a:tr h="447675">
+              <a:tr h="420935">
                 <a:tc>
                   <a:txBody>
                     <a:bodyPr/>
@@ -5583,7 +5441,7 @@
                   <a:tcPr/>
                 </a:tc>
               </a:tr>
-              <a:tr h="447675">
+              <a:tr h="420935">
                 <a:tc>
                   <a:txBody>
                     <a:bodyPr/>
@@ -5616,7 +5474,7 @@
                   <a:tcPr/>
                 </a:tc>
               </a:tr>
-              <a:tr h="447675">
+              <a:tr h="420935">
                 <a:tc>
                   <a:txBody>
                     <a:bodyPr/>
@@ -5646,7 +5504,7 @@
                   <a:tcPr/>
                 </a:tc>
               </a:tr>
-              <a:tr h="447675">
+              <a:tr h="420935">
                 <a:tc>
                   <a:txBody>
                     <a:bodyPr/>
@@ -5676,7 +5534,7 @@
                   <a:tcPr/>
                 </a:tc>
               </a:tr>
-              <a:tr h="447675">
+              <a:tr h="420935">
                 <a:tc>
                   <a:txBody>
                     <a:bodyPr/>
@@ -5706,7 +5564,7 @@
                   <a:tcPr/>
                 </a:tc>
               </a:tr>
-              <a:tr h="447675">
+              <a:tr h="420935">
                 <a:tc>
                   <a:txBody>
                     <a:bodyPr/>
@@ -5736,7 +5594,7 @@
                   <a:tcPr/>
                 </a:tc>
               </a:tr>
-              <a:tr h="447675">
+              <a:tr h="420935">
                 <a:tc>
                   <a:txBody>
                     <a:bodyPr/>
@@ -5766,7 +5624,7 @@
                   <a:tcPr/>
                 </a:tc>
               </a:tr>
-              <a:tr h="447675">
+              <a:tr h="420935">
                 <a:tc>
                   <a:txBody>
                     <a:bodyPr/>
@@ -5796,7 +5654,7 @@
                   <a:tcPr/>
                 </a:tc>
               </a:tr>
-              <a:tr h="447675">
+              <a:tr h="420935">
                 <a:tc>
                   <a:txBody>
                     <a:bodyPr/>
@@ -5826,7 +5684,7 @@
                   <a:tcPr/>
                 </a:tc>
               </a:tr>
-              <a:tr h="447675">
+              <a:tr h="859783">
                 <a:tc>
                   <a:txBody>
                     <a:bodyPr/>
@@ -5860,6 +5718,269 @@
           </a:graphicData>
         </a:graphic>
       </p:graphicFrame>
+      <p:sp>
+        <p:nvSpPr>
+          <p:cNvPr id="5" name="Title 1"/>
+          <p:cNvSpPr>
+            <a:spLocks noGrp="1"/>
+          </p:cNvSpPr>
+          <p:nvPr>
+            <p:ph type="title"/>
+          </p:nvPr>
+        </p:nvSpPr>
+        <p:spPr>
+          <a:xfrm>
+            <a:off x="457200" y="274638"/>
+            <a:ext cx="8229600" cy="3306762"/>
+          </a:xfrm>
+        </p:spPr>
+        <p:txBody>
+          <a:bodyPr>
+            <a:normAutofit/>
+          </a:bodyPr>
+          <a:lstStyle/>
+          <a:p>
+            <a:r>
+              <a:rPr lang="en-US" sz="2000" dirty="0" smtClean="0">
+                <a:solidFill>
+                  <a:schemeClr val="accent6"/>
+                </a:solidFill>
+              </a:rPr>
+              <a:t>Configuring </a:t>
+            </a:r>
+            <a:r>
+              <a:rPr lang="en-US" sz="2000" dirty="0" err="1" smtClean="0">
+                <a:solidFill>
+                  <a:schemeClr val="bg2"/>
+                </a:solidFill>
+              </a:rPr>
+              <a:t>rsyslogd</a:t>
+            </a:r>
+            <a:r>
+              <a:rPr lang="en-US" sz="2000" dirty="0" smtClean="0">
+                <a:solidFill>
+                  <a:schemeClr val="accent6"/>
+                </a:solidFill>
+              </a:rPr>
+              <a:t/>
+            </a:r>
+            <a:br>
+              <a:rPr lang="en-US" sz="2000" dirty="0" smtClean="0">
+                <a:solidFill>
+                  <a:schemeClr val="accent6"/>
+                </a:solidFill>
+              </a:rPr>
+            </a:br>
+            <a:r>
+              <a:rPr lang="en-US" sz="2000" dirty="0" smtClean="0">
+                <a:solidFill>
+                  <a:schemeClr val="accent6"/>
+                </a:solidFill>
+              </a:rPr>
+              <a:t>The configuration file for </a:t>
+            </a:r>
+            <a:r>
+              <a:rPr lang="en-US" sz="2000" dirty="0" err="1" smtClean="0">
+                <a:solidFill>
+                  <a:schemeClr val="accent6"/>
+                </a:solidFill>
+              </a:rPr>
+              <a:t>rsyslogd</a:t>
+            </a:r>
+            <a:r>
+              <a:rPr lang="en-US" sz="2000" dirty="0" smtClean="0">
+                <a:solidFill>
+                  <a:schemeClr val="accent6"/>
+                </a:solidFill>
+              </a:rPr>
+              <a:t> is </a:t>
+            </a:r>
+            <a:r>
+              <a:rPr lang="en-US" sz="2000" dirty="0" smtClean="0">
+                <a:solidFill>
+                  <a:schemeClr val="bg2"/>
+                </a:solidFill>
+              </a:rPr>
+              <a:t>/</a:t>
+            </a:r>
+            <a:r>
+              <a:rPr lang="en-US" sz="2000" dirty="0" err="1" smtClean="0">
+                <a:solidFill>
+                  <a:schemeClr val="bg2"/>
+                </a:solidFill>
+              </a:rPr>
+              <a:t>etc</a:t>
+            </a:r>
+            <a:r>
+              <a:rPr lang="en-US" sz="2000" dirty="0" smtClean="0">
+                <a:solidFill>
+                  <a:schemeClr val="bg2"/>
+                </a:solidFill>
+              </a:rPr>
+              <a:t>/</a:t>
+            </a:r>
+            <a:r>
+              <a:rPr lang="en-US" sz="2000" dirty="0" err="1" smtClean="0">
+                <a:solidFill>
+                  <a:schemeClr val="bg2"/>
+                </a:solidFill>
+              </a:rPr>
+              <a:t>rsyslog.conf</a:t>
+            </a:r>
+            <a:r>
+              <a:rPr lang="en-US" sz="2000" dirty="0" smtClean="0">
+                <a:solidFill>
+                  <a:schemeClr val="accent6"/>
+                </a:solidFill>
+              </a:rPr>
+              <a:t/>
+            </a:r>
+            <a:br>
+              <a:rPr lang="en-US" sz="2000" dirty="0" smtClean="0">
+                <a:solidFill>
+                  <a:schemeClr val="accent6"/>
+                </a:solidFill>
+              </a:rPr>
+            </a:br>
+            <a:r>
+              <a:rPr lang="en-US" sz="2000" dirty="0" smtClean="0">
+                <a:solidFill>
+                  <a:schemeClr val="accent6"/>
+                </a:solidFill>
+              </a:rPr>
+              <a:t>The most well-known way to filter syslog messages is to use the </a:t>
+            </a:r>
+            <a:r>
+              <a:rPr lang="en-US" sz="2000" dirty="0" smtClean="0">
+                <a:solidFill>
+                  <a:srgbClr val="FF0000"/>
+                </a:solidFill>
+              </a:rPr>
+              <a:t>facility</a:t>
+            </a:r>
+            <a:r>
+              <a:rPr lang="en-US" sz="2000" dirty="0" smtClean="0">
+                <a:solidFill>
+                  <a:schemeClr val="accent6"/>
+                </a:solidFill>
+              </a:rPr>
+              <a:t>(</a:t>
+            </a:r>
+            <a:r>
+              <a:rPr lang="en-US" sz="2000" dirty="0" err="1" smtClean="0">
+                <a:solidFill>
+                  <a:schemeClr val="accent6"/>
+                </a:solidFill>
+              </a:rPr>
+              <a:t>cathegory</a:t>
+            </a:r>
+            <a:r>
+              <a:rPr lang="en-US" sz="2000" dirty="0" smtClean="0">
+                <a:solidFill>
+                  <a:schemeClr val="accent6"/>
+                </a:solidFill>
+              </a:rPr>
+              <a:t>)/</a:t>
+            </a:r>
+            <a:r>
+              <a:rPr lang="en-US" sz="2000" dirty="0" smtClean="0">
+                <a:solidFill>
+                  <a:srgbClr val="FF0000"/>
+                </a:solidFill>
+              </a:rPr>
+              <a:t>severity</a:t>
+            </a:r>
+            <a:r>
+              <a:rPr lang="en-US" sz="2000" dirty="0" smtClean="0">
+                <a:solidFill>
+                  <a:schemeClr val="accent6"/>
+                </a:solidFill>
+              </a:rPr>
+              <a:t>(priority) method.</a:t>
+            </a:r>
+            <a:r>
+              <a:rPr lang="en-US" sz="2000" dirty="0">
+                <a:solidFill>
+                  <a:schemeClr val="accent6"/>
+                </a:solidFill>
+              </a:rPr>
+              <a:t/>
+            </a:r>
+            <a:br>
+              <a:rPr lang="en-US" sz="2000" dirty="0">
+                <a:solidFill>
+                  <a:schemeClr val="accent6"/>
+                </a:solidFill>
+              </a:rPr>
+            </a:br>
+            <a:r>
+              <a:rPr lang="en-US" sz="2000" dirty="0" smtClean="0">
+                <a:solidFill>
+                  <a:schemeClr val="accent6"/>
+                </a:solidFill>
+              </a:rPr>
+              <a:t/>
+            </a:r>
+            <a:br>
+              <a:rPr lang="en-US" sz="2000" dirty="0" smtClean="0">
+                <a:solidFill>
+                  <a:schemeClr val="accent6"/>
+                </a:solidFill>
+              </a:rPr>
+            </a:br>
+            <a:r>
+              <a:rPr lang="en-US" sz="2000" dirty="0" smtClean="0">
+                <a:solidFill>
+                  <a:schemeClr val="accent6"/>
+                </a:solidFill>
+              </a:rPr>
+              <a:t/>
+            </a:r>
+            <a:br>
+              <a:rPr lang="en-US" sz="2000" dirty="0" smtClean="0">
+                <a:solidFill>
+                  <a:schemeClr val="accent6"/>
+                </a:solidFill>
+              </a:rPr>
+            </a:br>
+            <a:r>
+              <a:rPr lang="en-US" sz="2000" dirty="0" smtClean="0">
+                <a:solidFill>
+                  <a:schemeClr val="accent6"/>
+                </a:solidFill>
+              </a:rPr>
+              <a:t/>
+            </a:r>
+            <a:br>
+              <a:rPr lang="en-US" sz="2000" dirty="0" smtClean="0">
+                <a:solidFill>
+                  <a:schemeClr val="accent6"/>
+                </a:solidFill>
+              </a:rPr>
+            </a:br>
+            <a:r>
+              <a:rPr lang="en-US" sz="2000" dirty="0">
+                <a:solidFill>
+                  <a:schemeClr val="accent6"/>
+                </a:solidFill>
+              </a:rPr>
+              <a:t/>
+            </a:r>
+            <a:br>
+              <a:rPr lang="en-US" sz="2000" dirty="0">
+                <a:solidFill>
+                  <a:schemeClr val="accent6"/>
+                </a:solidFill>
+              </a:rPr>
+            </a:br>
+            <a:endParaRPr lang="en-US" sz="2000" dirty="0">
+              <a:solidFill>
+                <a:schemeClr val="accent6"/>
+              </a:solidFill>
+            </a:endParaRPr>
+          </a:p>
+        </p:txBody>
+      </p:sp>
     </p:spTree>
     <p:extLst>
       <p:ext uri="{BB962C8B-B14F-4D97-AF65-F5344CB8AC3E}">
@@ -6030,25 +6151,57 @@
             <a:r>
               <a:rPr lang="en-US" sz="1800" dirty="0" smtClean="0">
                 <a:solidFill>
-                  <a:schemeClr val="accent6"/>
-                </a:solidFill>
-              </a:rPr>
-              <a:t>kern.* =&gt; select all kernel syslog messages with any priority.</a:t>
-            </a:r>
-            <a:br>
+                  <a:srgbClr val="FF0000"/>
+                </a:solidFill>
+              </a:rPr>
+              <a:t>kern.* </a:t>
+            </a:r>
+            <a:r>
               <a:rPr lang="en-US" sz="1800" dirty="0" smtClean="0">
                 <a:solidFill>
                   <a:schemeClr val="accent6"/>
                 </a:solidFill>
               </a:rPr>
-            </a:br>
+              <a:t>=&gt; select all kernel syslog messages with any priority.</a:t>
+            </a:r>
+            <a:br>
+              <a:rPr lang="en-US" sz="1800" dirty="0" smtClean="0">
+                <a:solidFill>
+                  <a:schemeClr val="accent6"/>
+                </a:solidFill>
+              </a:rPr>
+            </a:br>
+            <a:r>
+              <a:rPr lang="en-US" sz="1800" dirty="0" smtClean="0">
+                <a:solidFill>
+                  <a:schemeClr val="accent6"/>
+                </a:solidFill>
+              </a:rPr>
+              <a:t>kern</a:t>
+            </a:r>
+            <a:r>
+              <a:rPr lang="en-US" sz="1800" dirty="0" smtClean="0">
+                <a:solidFill>
+                  <a:schemeClr val="accent6"/>
+                </a:solidFill>
+              </a:rPr>
+              <a:t> </a:t>
+            </a:r>
+            <a:r>
+              <a:rPr lang="en-US" sz="1800" dirty="0" smtClean="0">
+                <a:solidFill>
+                  <a:schemeClr val="accent6"/>
+                </a:solidFill>
+              </a:rPr>
+              <a:t>= Facility(</a:t>
+            </a:r>
             <a:r>
               <a:rPr lang="en-US" sz="1800" dirty="0" err="1" smtClean="0">
                 <a:solidFill>
                   <a:schemeClr val="accent6"/>
                 </a:solidFill>
               </a:rPr>
-              <a:t>Kenr</a:t>
+              <a:t>Cathegory</a:t>
             </a:r>
             <a:r>
               <a:rPr lang="en-US" sz="1800" dirty="0" smtClean="0">
@@ -6056,15 +6209,52 @@
                   <a:schemeClr val="accent6"/>
                 </a:solidFill>
               </a:rPr>
-              <a:t> = Facility(</a:t>
-            </a:r>
+              <a:t>)</a:t>
+            </a:r>
+            <a:br>
+              <a:rPr lang="en-US" sz="1800" dirty="0" smtClean="0">
+                <a:solidFill>
+                  <a:schemeClr val="accent6"/>
+                </a:solidFill>
+              </a:rPr>
+            </a:br>
+            <a:r>
+              <a:rPr lang="en-US" sz="1800" dirty="0" smtClean="0">
+                <a:solidFill>
+                  <a:schemeClr val="accent6"/>
+                </a:solidFill>
+              </a:rPr>
+              <a:t>* = Severity(Priority)</a:t>
+            </a:r>
+            <a:br>
+              <a:rPr lang="en-US" sz="1800" dirty="0" smtClean="0">
+                <a:solidFill>
+                  <a:schemeClr val="accent6"/>
+                </a:solidFill>
+              </a:rPr>
+            </a:br>
+            <a:r>
+              <a:rPr lang="en-US" sz="1800" dirty="0">
+                <a:solidFill>
+                  <a:schemeClr val="accent6"/>
+                </a:solidFill>
+              </a:rPr>
+              <a:t/>
+            </a:r>
+            <a:br>
+              <a:rPr lang="en-US" sz="1800" dirty="0">
+                <a:solidFill>
+                  <a:schemeClr val="accent6"/>
+                </a:solidFill>
+              </a:rPr>
+            </a:br>
             <a:r>
               <a:rPr lang="en-US" sz="1800" dirty="0" err="1" smtClean="0">
                 <a:solidFill>
-                  <a:schemeClr val="accent6"/>
-                </a:solidFill>
-              </a:rPr>
-              <a:t>Cathegory</a:t>
+                  <a:srgbClr val="FF0000"/>
+                </a:solidFill>
+              </a:rPr>
+              <a:t>mail.crit</a:t>
             </a:r>
             <a:r>
               <a:rPr lang="en-US" sz="1800" dirty="0" smtClean="0">
@@ -6072,22 +6262,31 @@
                   <a:schemeClr val="accent6"/>
                 </a:solidFill>
               </a:rPr>
-              <a:t>)</a:t>
-            </a:r>
-            <a:br>
+              <a:t> </a:t>
+            </a:r>
+            <a:r>
               <a:rPr lang="en-US" sz="1800" dirty="0" smtClean="0">
                 <a:solidFill>
                   <a:schemeClr val="accent6"/>
                 </a:solidFill>
               </a:rPr>
-            </a:br>
+              <a:t>=&gt; All messages from Facility mail with Severity </a:t>
+            </a:r>
+            <a:r>
+              <a:rPr lang="en-US" sz="1800" dirty="0" err="1" smtClean="0">
+                <a:solidFill>
+                  <a:schemeClr val="accent6"/>
+                </a:solidFill>
+              </a:rPr>
+              <a:t>crit</a:t>
+            </a:r>
             <a:r>
               <a:rPr lang="en-US" sz="1800" dirty="0" smtClean="0">
                 <a:solidFill>
                   <a:schemeClr val="accent6"/>
                 </a:solidFill>
               </a:rPr>
-              <a:t>* = Severity(Priority)</a:t>
+              <a:t/>
             </a:r>
             <a:br>
               <a:rPr lang="en-US" sz="1800" dirty="0" smtClean="0">
@@ -6114,41 +6313,65 @@
             <a:r>
               <a:rPr lang="en-US" sz="1800" dirty="0" err="1" smtClean="0">
                 <a:solidFill>
-                  <a:schemeClr val="accent6"/>
-                </a:solidFill>
-              </a:rPr>
-              <a:t>mai.crit</a:t>
+                  <a:srgbClr val="FF0000"/>
+                </a:solidFill>
+              </a:rPr>
+              <a:t>cron</a:t>
             </a:r>
             <a:r>
               <a:rPr lang="en-US" sz="1800" dirty="0" smtClean="0">
                 <a:solidFill>
-                  <a:schemeClr val="accent6"/>
-                </a:solidFill>
-              </a:rPr>
-              <a:t> =&gt; All messages from Facility mail with Severity </a:t>
+                  <a:srgbClr val="FF0000"/>
+                </a:solidFill>
+              </a:rPr>
+              <a:t>.!</a:t>
             </a:r>
             <a:r>
               <a:rPr lang="en-US" sz="1800" dirty="0" err="1" smtClean="0">
                 <a:solidFill>
-                  <a:schemeClr val="accent6"/>
-                </a:solidFill>
-              </a:rPr>
-              <a:t>crit</a:t>
+                  <a:srgbClr val="FF0000"/>
+                </a:solidFill>
+              </a:rPr>
+              <a:t>info,!debug</a:t>
             </a:r>
             <a:r>
               <a:rPr lang="en-US" sz="1800" dirty="0" smtClean="0">
                 <a:solidFill>
-                  <a:schemeClr val="accent6"/>
-                </a:solidFill>
-              </a:rPr>
-              <a:t/>
-            </a:r>
-            <a:br>
+                  <a:srgbClr val="FF0000"/>
+                </a:solidFill>
+              </a:rPr>
+              <a:t> </a:t>
+            </a:r>
+            <a:r>
               <a:rPr lang="en-US" sz="1800" dirty="0" smtClean="0">
                 <a:solidFill>
                   <a:schemeClr val="accent6"/>
                 </a:solidFill>
               </a:rPr>
+              <a:t>=&gt; All messages from Facility </a:t>
+            </a:r>
+            <a:r>
+              <a:rPr lang="en-US" sz="1800" dirty="0" err="1" smtClean="0">
+                <a:solidFill>
+                  <a:schemeClr val="accent6"/>
+                </a:solidFill>
+              </a:rPr>
+              <a:t>cron</a:t>
+            </a:r>
+            <a:r>
+              <a:rPr lang="en-US" sz="1800" dirty="0" smtClean="0">
+                <a:solidFill>
+                  <a:schemeClr val="accent6"/>
+                </a:solidFill>
+              </a:rPr>
+              <a:t> with Severity different than info and debug.</a:t>
+            </a:r>
+            <a:br>
+              <a:rPr lang="en-US" sz="1800" dirty="0" smtClean="0">
+                <a:solidFill>
+                  <a:schemeClr val="accent6"/>
+                </a:solidFill>
+              </a:rPr>
             </a:br>
             <a:r>
               <a:rPr lang="en-US" sz="1800" dirty="0">
@@ -6166,28 +6389,12 @@
               </a:rPr>
             </a:br>
             <a:r>
-              <a:rPr lang="en-US" sz="1800" dirty="0" err="1" smtClean="0">
-                <a:solidFill>
-                  <a:schemeClr val="accent6"/>
-                </a:solidFill>
-              </a:rPr>
-              <a:t>cron</a:t>
-            </a:r>
-            <a:r>
               <a:rPr lang="en-US" sz="1800" dirty="0" smtClean="0">
                 <a:solidFill>
-                  <a:schemeClr val="accent6"/>
-                </a:solidFill>
-              </a:rPr>
-              <a:t>.!</a:t>
-            </a:r>
-            <a:r>
-              <a:rPr lang="en-US" sz="1800" dirty="0" err="1" smtClean="0">
-                <a:solidFill>
-                  <a:schemeClr val="accent6"/>
-                </a:solidFill>
-              </a:rPr>
-              <a:t>info,!debug</a:t>
+                  <a:srgbClr val="FF0000"/>
+                </a:solidFill>
+              </a:rPr>
+              <a:t>Exercise:</a:t>
             </a:r>
             <a:r>
               <a:rPr lang="en-US" sz="1800" dirty="0" smtClean="0">
@@ -6195,53 +6402,7 @@
                   <a:schemeClr val="accent6"/>
                 </a:solidFill>
               </a:rPr>
-              <a:t> =&gt; All messages from Facility </a:t>
-            </a:r>
-            <a:r>
-              <a:rPr lang="en-US" sz="1800" dirty="0" err="1" smtClean="0">
-                <a:solidFill>
-                  <a:schemeClr val="accent6"/>
-                </a:solidFill>
-              </a:rPr>
-              <a:t>cron</a:t>
-            </a:r>
-            <a:r>
-              <a:rPr lang="en-US" sz="1800" dirty="0" smtClean="0">
-                <a:solidFill>
-                  <a:schemeClr val="accent6"/>
-                </a:solidFill>
-              </a:rPr>
-              <a:t> with Severity different than info and debug.</a:t>
-            </a:r>
-            <a:br>
-              <a:rPr lang="en-US" sz="1800" dirty="0" smtClean="0">
-                <a:solidFill>
-                  <a:schemeClr val="accent6"/>
-                </a:solidFill>
-              </a:rPr>
-            </a:br>
-            <a:r>
-              <a:rPr lang="en-US" sz="1800" dirty="0">
-                <a:solidFill>
-                  <a:schemeClr val="accent6"/>
-                </a:solidFill>
-              </a:rPr>
-              <a:t/>
-            </a:r>
-            <a:br>
-              <a:rPr lang="en-US" sz="1800" dirty="0">
-                <a:solidFill>
-                  <a:schemeClr val="accent6"/>
-                </a:solidFill>
-              </a:rPr>
-            </a:br>
-            <a:r>
-              <a:rPr lang="en-US" sz="1800" dirty="0" smtClean="0">
-                <a:solidFill>
-                  <a:schemeClr val="accent6"/>
-                </a:solidFill>
-              </a:rPr>
-              <a:t>Exercise:</a:t>
+              <a:t/>
             </a:r>
             <a:br>
               <a:rPr lang="en-US" sz="1800" dirty="0" smtClean="0">
@@ -6349,7 +6510,7 @@
       </p:grpSpPr>
       <p:sp>
         <p:nvSpPr>
-          <p:cNvPr id="2" name="Title 1"/>
+          <p:cNvPr id="5" name="Title 1"/>
           <p:cNvSpPr>
             <a:spLocks noGrp="1"/>
           </p:cNvSpPr>
@@ -6615,7 +6776,7 @@
             <a:r>
               <a:rPr lang="en-US" sz="2700" dirty="0" err="1" smtClean="0">
                 <a:solidFill>
-                  <a:schemeClr val="accent6"/>
+                  <a:schemeClr val="bg1"/>
                 </a:solidFill>
               </a:rPr>
               <a:t>logrotate</a:t>
@@ -6770,7 +6931,7 @@
             <a:r>
               <a:rPr lang="en-US" dirty="0" smtClean="0">
                 <a:solidFill>
-                  <a:schemeClr val="accent6"/>
+                  <a:schemeClr val="bg1"/>
                 </a:solidFill>
               </a:rPr>
               <a:t>cat /</a:t>
@@ -6778,7 +6939,7 @@
             <a:r>
               <a:rPr lang="en-US" dirty="0" err="1" smtClean="0">
                 <a:solidFill>
-                  <a:schemeClr val="accent6"/>
+                  <a:schemeClr val="bg1"/>
                 </a:solidFill>
               </a:rPr>
               <a:t>etc</a:t>
@@ -6786,7 +6947,7 @@
             <a:r>
               <a:rPr lang="en-US" dirty="0" smtClean="0">
                 <a:solidFill>
-                  <a:schemeClr val="accent6"/>
+                  <a:schemeClr val="bg1"/>
                 </a:solidFill>
               </a:rPr>
               <a:t>/</a:t>
@@ -6794,35 +6955,16 @@
             <a:r>
               <a:rPr lang="en-US" dirty="0" err="1" smtClean="0">
                 <a:solidFill>
-                  <a:schemeClr val="accent6"/>
+                  <a:schemeClr val="bg1"/>
                 </a:solidFill>
               </a:rPr>
               <a:t>logrotate.conf</a:t>
             </a:r>
             <a:endParaRPr lang="en-US" dirty="0">
               <a:solidFill>
-                <a:schemeClr val="accent6"/>
+                <a:schemeClr val="bg1"/>
               </a:solidFill>
             </a:endParaRPr>
-          </a:p>
-        </p:txBody>
-      </p:sp>
-      <p:sp>
-        <p:nvSpPr>
-          <p:cNvPr id="3" name="Content Placeholder 2"/>
-          <p:cNvSpPr>
-            <a:spLocks noGrp="1"/>
-          </p:cNvSpPr>
-          <p:nvPr>
-            <p:ph idx="1"/>
-          </p:nvPr>
-        </p:nvSpPr>
-        <p:spPr/>
-        <p:txBody>
-          <a:bodyPr/>
-          <a:lstStyle/>
-          <a:p>
-            <a:endParaRPr lang="en-US" dirty="0"/>
           </a:p>
         </p:txBody>
       </p:sp>
@@ -6858,7 +7000,7 @@
       </p:grpSpPr>
       <p:sp>
         <p:nvSpPr>
-          <p:cNvPr id="2" name="Title 1"/>
+          <p:cNvPr id="5" name="Title 1"/>
           <p:cNvSpPr>
             <a:spLocks noGrp="1"/>
           </p:cNvSpPr>
@@ -6951,30 +7093,38 @@
             <a:r>
               <a:rPr lang="en-US" dirty="0" smtClean="0">
                 <a:solidFill>
-                  <a:schemeClr val="accent6"/>
+                  <a:srgbClr val="FF0000"/>
                 </a:solidFill>
               </a:rPr>
               <a:t>Exercises:</a:t>
             </a:r>
-            <a:br>
+            <a:r>
               <a:rPr lang="en-US" dirty="0" smtClean="0">
                 <a:solidFill>
                   <a:schemeClr val="accent6"/>
                 </a:solidFill>
               </a:rPr>
-            </a:br>
-            <a:r>
+              <a:t/>
+            </a:r>
+            <a:br>
               <a:rPr lang="en-US" dirty="0" smtClean="0">
                 <a:solidFill>
                   <a:schemeClr val="accent6"/>
                 </a:solidFill>
               </a:rPr>
+            </a:br>
+            <a:r>
+              <a:rPr lang="en-US" dirty="0" smtClean="0">
+                <a:solidFill>
+                  <a:schemeClr val="accent6"/>
+                </a:solidFill>
+              </a:rPr>
               <a:t>1. </a:t>
             </a:r>
             <a:r>
               <a:rPr lang="en-US" dirty="0" err="1" smtClean="0">
                 <a:solidFill>
-                  <a:schemeClr val="accent6"/>
+                  <a:schemeClr val="bg2"/>
                 </a:solidFill>
               </a:rPr>
               <a:t>journactl</a:t>
@@ -6982,30 +7132,38 @@
             <a:r>
               <a:rPr lang="en-US" dirty="0" smtClean="0">
                 <a:solidFill>
-                  <a:schemeClr val="accent6"/>
+                  <a:schemeClr val="bg2"/>
                 </a:solidFill>
               </a:rPr>
               <a:t> –f</a:t>
             </a:r>
-            <a:br>
+            <a:r>
               <a:rPr lang="en-US" dirty="0" smtClean="0">
                 <a:solidFill>
                   <a:schemeClr val="accent6"/>
                 </a:solidFill>
               </a:rPr>
-            </a:br>
-            <a:r>
+              <a:t/>
+            </a:r>
+            <a:br>
               <a:rPr lang="en-US" dirty="0" smtClean="0">
                 <a:solidFill>
                   <a:schemeClr val="accent6"/>
                 </a:solidFill>
               </a:rPr>
+            </a:br>
+            <a:r>
+              <a:rPr lang="en-US" dirty="0" smtClean="0">
+                <a:solidFill>
+                  <a:schemeClr val="accent6"/>
+                </a:solidFill>
+              </a:rPr>
               <a:t>2. </a:t>
             </a:r>
             <a:r>
               <a:rPr lang="en-US" dirty="0" err="1" smtClean="0">
                 <a:solidFill>
-                  <a:schemeClr val="accent6"/>
+                  <a:schemeClr val="bg2"/>
                 </a:solidFill>
               </a:rPr>
               <a:t>journalctl</a:t>
@@ -7036,7 +7194,7 @@
             <a:r>
               <a:rPr lang="en-US" dirty="0" err="1" smtClean="0">
                 <a:solidFill>
-                  <a:schemeClr val="accent6"/>
+                  <a:schemeClr val="bg2"/>
                 </a:solidFill>
               </a:rPr>
               <a:t>journalctl</a:t>
@@ -7044,7 +7202,7 @@
             <a:r>
               <a:rPr lang="en-US" dirty="0" smtClean="0">
                 <a:solidFill>
-                  <a:schemeClr val="accent6"/>
+                  <a:schemeClr val="bg2"/>
                 </a:solidFill>
               </a:rPr>
               <a:t> (tab tab) _UID=0</a:t>
@@ -7052,7 +7210,7 @@
             <a:br>
               <a:rPr lang="en-US" dirty="0" smtClean="0">
                 <a:solidFill>
-                  <a:schemeClr val="accent6"/>
+                  <a:schemeClr val="bg2"/>
                 </a:solidFill>
               </a:rPr>
             </a:br>
@@ -7067,7 +7225,7 @@
             <a:r>
               <a:rPr lang="en-US" dirty="0" err="1" smtClean="0">
                 <a:solidFill>
-                  <a:schemeClr val="accent6"/>
+                  <a:schemeClr val="bg2"/>
                 </a:solidFill>
               </a:rPr>
               <a:t>journalctl</a:t>
@@ -7075,35 +7233,16 @@
             <a:r>
               <a:rPr lang="en-US" dirty="0" smtClean="0">
                 <a:solidFill>
-                  <a:schemeClr val="accent6"/>
+                  <a:schemeClr val="bg2"/>
                 </a:solidFill>
               </a:rPr>
               <a:t> –p err</a:t>
             </a:r>
             <a:endParaRPr lang="en-US" dirty="0">
               <a:solidFill>
-                <a:schemeClr val="accent6"/>
+                <a:schemeClr val="bg2"/>
               </a:solidFill>
             </a:endParaRPr>
-          </a:p>
-        </p:txBody>
-      </p:sp>
-      <p:sp>
-        <p:nvSpPr>
-          <p:cNvPr id="3" name="Content Placeholder 2"/>
-          <p:cNvSpPr>
-            <a:spLocks noGrp="1"/>
-          </p:cNvSpPr>
-          <p:nvPr>
-            <p:ph idx="1"/>
-          </p:nvPr>
-        </p:nvSpPr>
-        <p:spPr/>
-        <p:txBody>
-          <a:bodyPr/>
-          <a:lstStyle/>
-          <a:p>
-            <a:endParaRPr lang="en-US" dirty="0"/>
           </a:p>
         </p:txBody>
       </p:sp>

</xml_diff>